<commit_message>
More Power point changes, I put the UML on another slide
</commit_message>
<xml_diff>
--- a/Mythical Creature Catalog.pptx
+++ b/Mythical Creature Catalog.pptx
@@ -6,6 +6,7 @@
   </p:sldMasterIdLst>
   <p:sldIdLst>
     <p:sldId id="256" r:id="rId2"/>
+    <p:sldId id="257" r:id="rId3"/>
   </p:sldIdLst>
   <p:sldSz cx="12192000" cy="6858000"/>
   <p:notesSz cx="6858000" cy="9144000"/>
@@ -3485,8 +3486,8 @@
         </p:blipFill>
         <p:spPr>
           <a:xfrm>
-            <a:off x="5851299" y="5508823"/>
-            <a:ext cx="2638380" cy="1283182"/>
+            <a:off x="3213278" y="1971772"/>
+            <a:ext cx="3912165" cy="1902690"/>
           </a:xfrm>
           <a:prstGeom prst="rect">
             <a:avLst/>
@@ -3719,10 +3720,10 @@
       </p:pic>
       <p:pic>
         <p:nvPicPr>
-          <p:cNvPr id="23" name="Picture 22" descr="A black and white screen shot of a computer">
-            <a:extLst>
-              <a:ext uri="{FF2B5EF4-FFF2-40B4-BE49-F238E27FC236}">
-                <a16:creationId xmlns:a16="http://schemas.microsoft.com/office/drawing/2014/main" id="{6637CEB7-67EB-1C27-8842-605BED5ED490}"/>
+          <p:cNvPr id="27" name="Picture 26">
+            <a:extLst>
+              <a:ext uri="{FF2B5EF4-FFF2-40B4-BE49-F238E27FC236}">
+                <a16:creationId xmlns:a16="http://schemas.microsoft.com/office/drawing/2014/main" id="{FC4DB9E8-DBA3-5E30-9372-530E53428C76}"/>
               </a:ext>
             </a:extLst>
           </p:cNvPr>
@@ -3732,43 +3733,7 @@
           <p:nvPr/>
         </p:nvPicPr>
         <p:blipFill>
-          <a:blip r:embed="rId5">
-            <a:extLst>
-              <a:ext uri="{28A0092B-C50C-407E-A947-70E740481C1C}">
-                <a14:useLocalDpi xmlns:a14="http://schemas.microsoft.com/office/drawing/2010/main" val="0"/>
-              </a:ext>
-            </a:extLst>
-          </a:blip>
-          <a:stretch>
-            <a:fillRect/>
-          </a:stretch>
-        </p:blipFill>
-        <p:spPr>
-          <a:xfrm>
-            <a:off x="0" y="5931299"/>
-            <a:ext cx="5851301" cy="926700"/>
-          </a:xfrm>
-          <a:prstGeom prst="rect">
-            <a:avLst/>
-          </a:prstGeom>
-        </p:spPr>
-      </p:pic>
-      <p:pic>
-        <p:nvPicPr>
-          <p:cNvPr id="27" name="Picture 26">
-            <a:extLst>
-              <a:ext uri="{FF2B5EF4-FFF2-40B4-BE49-F238E27FC236}">
-                <a16:creationId xmlns:a16="http://schemas.microsoft.com/office/drawing/2014/main" id="{FC4DB9E8-DBA3-5E30-9372-530E53428C76}"/>
-              </a:ext>
-            </a:extLst>
-          </p:cNvPr>
-          <p:cNvPicPr>
-            <a:picLocks noChangeAspect="1"/>
-          </p:cNvPicPr>
-          <p:nvPr/>
-        </p:nvPicPr>
-        <p:blipFill>
-          <a:blip r:embed="rId6"/>
+          <a:blip r:embed="rId5"/>
           <a:stretch>
             <a:fillRect/>
           </a:stretch>
@@ -3838,7 +3803,7 @@
         </p:nvSpPr>
         <p:spPr>
           <a:xfrm>
-            <a:off x="1640005" y="5561967"/>
+            <a:off x="443344" y="3505130"/>
             <a:ext cx="2571289" cy="369332"/>
           </a:xfrm>
           <a:prstGeom prst="rect">
@@ -3868,10 +3833,10 @@
       </p:sp>
       <p:pic>
         <p:nvPicPr>
-          <p:cNvPr id="31" name="Picture 30" descr="A screenshot of a computer screen&#10;&#10;AI-generated content may be incorrect.">
-            <a:extLst>
-              <a:ext uri="{FF2B5EF4-FFF2-40B4-BE49-F238E27FC236}">
-                <a16:creationId xmlns:a16="http://schemas.microsoft.com/office/drawing/2014/main" id="{81610B88-04F1-53A4-9F10-BF6A28A5CAB2}"/>
+          <p:cNvPr id="34" name="Picture 33" descr="A black screen with white text&#10;&#10;AI-generated content may be incorrect.">
+            <a:extLst>
+              <a:ext uri="{FF2B5EF4-FFF2-40B4-BE49-F238E27FC236}">
+                <a16:creationId xmlns:a16="http://schemas.microsoft.com/office/drawing/2014/main" id="{657F24C9-10F1-378E-E858-773354A559CF}"/>
               </a:ext>
             </a:extLst>
           </p:cNvPr>
@@ -3881,7 +3846,7 @@
           <p:nvPr/>
         </p:nvPicPr>
         <p:blipFill>
-          <a:blip r:embed="rId7">
+          <a:blip r:embed="rId6">
             <a:extLst>
               <a:ext uri="{28A0092B-C50C-407E-A947-70E740481C1C}">
                 <a14:useLocalDpi xmlns:a14="http://schemas.microsoft.com/office/drawing/2010/main" val="0"/>
@@ -3894,14 +3859,157 @@
         </p:blipFill>
         <p:spPr>
           <a:xfrm>
-            <a:off x="3200690" y="2788594"/>
-            <a:ext cx="5186578" cy="3154220"/>
+            <a:off x="67757" y="3910769"/>
+            <a:ext cx="5290896" cy="2972573"/>
           </a:xfrm>
           <a:prstGeom prst="rect">
             <a:avLst/>
           </a:prstGeom>
+          <a:gradFill>
+            <a:gsLst>
+              <a:gs pos="0">
+                <a:schemeClr val="accent4">
+                  <a:lumMod val="5000"/>
+                  <a:lumOff val="95000"/>
+                </a:schemeClr>
+              </a:gs>
+              <a:gs pos="70000">
+                <a:srgbClr val="72BEEB"/>
+              </a:gs>
+              <a:gs pos="41000">
+                <a:schemeClr val="tx2">
+                  <a:lumMod val="50000"/>
+                  <a:lumOff val="50000"/>
+                </a:schemeClr>
+              </a:gs>
+              <a:gs pos="83000">
+                <a:schemeClr val="accent4">
+                  <a:lumMod val="45000"/>
+                  <a:lumOff val="55000"/>
+                </a:schemeClr>
+              </a:gs>
+              <a:gs pos="100000">
+                <a:schemeClr val="accent4">
+                  <a:lumMod val="30000"/>
+                  <a:lumOff val="70000"/>
+                </a:schemeClr>
+              </a:gs>
+            </a:gsLst>
+            <a:path path="circle">
+              <a:fillToRect l="100000" t="100000"/>
+            </a:path>
+          </a:gradFill>
         </p:spPr>
       </p:pic>
+    </p:spTree>
+    <p:extLst>
+      <p:ext uri="{BB962C8B-B14F-4D97-AF65-F5344CB8AC3E}">
+        <p14:creationId xmlns:p14="http://schemas.microsoft.com/office/powerpoint/2010/main" val="1993074525"/>
+      </p:ext>
+    </p:extLst>
+  </p:cSld>
+  <p:clrMapOvr>
+    <a:masterClrMapping/>
+  </p:clrMapOvr>
+</p:sld>
+</file>
+
+<file path=ppt/slides/slide2.xml><?xml version="1.0" encoding="utf-8"?>
+<p:sld xmlns:a="http://schemas.openxmlformats.org/drawingml/2006/main" xmlns:r="http://schemas.openxmlformats.org/officeDocument/2006/relationships" xmlns:p="http://schemas.openxmlformats.org/presentationml/2006/main">
+  <p:cSld>
+    <p:bg>
+      <p:bgPr>
+        <a:solidFill>
+          <a:srgbClr val="181614"/>
+        </a:solidFill>
+        <a:effectLst/>
+      </p:bgPr>
+    </p:bg>
+    <p:spTree>
+      <p:nvGrpSpPr>
+        <p:cNvPr id="1" name=""/>
+        <p:cNvGrpSpPr/>
+        <p:nvPr/>
+      </p:nvGrpSpPr>
+      <p:grpSpPr>
+        <a:xfrm>
+          <a:off x="0" y="0"/>
+          <a:ext cx="0" cy="0"/>
+          <a:chOff x="0" y="0"/>
+          <a:chExt cx="0" cy="0"/>
+        </a:xfrm>
+      </p:grpSpPr>
+      <p:pic>
+        <p:nvPicPr>
+          <p:cNvPr id="2" name="Picture 1" descr="A screenshot of a computer screen&#10;&#10;AI-generated content may be incorrect.">
+            <a:extLst>
+              <a:ext uri="{FF2B5EF4-FFF2-40B4-BE49-F238E27FC236}">
+                <a16:creationId xmlns:a16="http://schemas.microsoft.com/office/drawing/2014/main" id="{6621BE5A-AE98-4884-39B2-DBCBAAA5F1BE}"/>
+              </a:ext>
+            </a:extLst>
+          </p:cNvPr>
+          <p:cNvPicPr>
+            <a:picLocks noChangeAspect="1"/>
+          </p:cNvPicPr>
+          <p:nvPr/>
+        </p:nvPicPr>
+        <p:blipFill>
+          <a:blip r:embed="rId2">
+            <a:extLst>
+              <a:ext uri="{28A0092B-C50C-407E-A947-70E740481C1C}">
+                <a14:useLocalDpi xmlns:a14="http://schemas.microsoft.com/office/drawing/2010/main" val="0"/>
+              </a:ext>
+            </a:extLst>
+          </a:blip>
+          <a:stretch>
+            <a:fillRect/>
+          </a:stretch>
+        </p:blipFill>
+        <p:spPr>
+          <a:xfrm>
+            <a:off x="1124181" y="709919"/>
+            <a:ext cx="9943637" cy="6047228"/>
+          </a:xfrm>
+          <a:prstGeom prst="rect">
+            <a:avLst/>
+          </a:prstGeom>
+          <a:gradFill flip="none" rotWithShape="1">
+            <a:gsLst>
+              <a:gs pos="0">
+                <a:schemeClr val="accent4">
+                  <a:lumMod val="5000"/>
+                  <a:lumOff val="95000"/>
+                </a:schemeClr>
+              </a:gs>
+              <a:gs pos="45000">
+                <a:srgbClr val="72BEEB"/>
+              </a:gs>
+              <a:gs pos="25000">
+                <a:schemeClr val="tx2">
+                  <a:lumMod val="50000"/>
+                  <a:lumOff val="50000"/>
+                </a:schemeClr>
+              </a:gs>
+              <a:gs pos="77000">
+                <a:schemeClr val="accent4">
+                  <a:lumMod val="45000"/>
+                  <a:lumOff val="55000"/>
+                </a:schemeClr>
+              </a:gs>
+              <a:gs pos="100000">
+                <a:schemeClr val="accent4">
+                  <a:lumMod val="30000"/>
+                  <a:lumOff val="70000"/>
+                </a:schemeClr>
+              </a:gs>
+            </a:gsLst>
+            <a:path path="circle">
+              <a:fillToRect l="100000" t="100000"/>
+            </a:path>
+            <a:tileRect r="-100000" b="-100000"/>
+          </a:gradFill>
+        </p:spPr>
+      </p:pic>
       <p:sp>
         <p:nvSpPr>
           <p:cNvPr id="32" name="TextBox 31">
@@ -3916,7 +4024,7 @@
         </p:nvSpPr>
         <p:spPr>
           <a:xfrm>
-            <a:off x="5288663" y="2413023"/>
+            <a:off x="5315494" y="167364"/>
             <a:ext cx="1561011" cy="369332"/>
           </a:xfrm>
           <a:prstGeom prst="rect">
@@ -3947,7 +4055,7 @@
     </p:spTree>
     <p:extLst>
       <p:ext uri="{BB962C8B-B14F-4D97-AF65-F5344CB8AC3E}">
-        <p14:creationId xmlns:p14="http://schemas.microsoft.com/office/powerpoint/2010/main" val="1993074525"/>
+        <p14:creationId xmlns:p14="http://schemas.microsoft.com/office/powerpoint/2010/main" val="1846248806"/>
       </p:ext>
     </p:extLst>
   </p:cSld>

</xml_diff>

<commit_message>
ok I'm going to bed for now I think its good enough even though things need to be changed
</commit_message>
<xml_diff>
--- a/Mythical Creature Catalog.pptx
+++ b/Mythical Creature Catalog.pptx
@@ -3486,7 +3486,7 @@
         </p:blipFill>
         <p:spPr>
           <a:xfrm>
-            <a:off x="3213278" y="1971772"/>
+            <a:off x="3213279" y="2008079"/>
             <a:ext cx="3912165" cy="1902690"/>
           </a:xfrm>
           <a:prstGeom prst="rect">
@@ -3803,7 +3803,7 @@
         </p:nvSpPr>
         <p:spPr>
           <a:xfrm>
-            <a:off x="443344" y="3505130"/>
+            <a:off x="977817" y="3516562"/>
             <a:ext cx="2571289" cy="369332"/>
           </a:xfrm>
           <a:prstGeom prst="rect">

</xml_diff>

<commit_message>
Added concise team member contribution
</commit_message>
<xml_diff>
--- a/Mythical Creature Catalog.pptx
+++ b/Mythical Creature Catalog.pptx
@@ -1,12 +1,12 @@
 
 <file path=ppt/presentation.xml><?xml version="1.0" encoding="utf-8"?>
-<p:presentation xmlns:a="http://schemas.openxmlformats.org/drawingml/2006/main" xmlns:r="http://schemas.openxmlformats.org/officeDocument/2006/relationships" xmlns:p="http://schemas.openxmlformats.org/presentationml/2006/main" saveSubsetFonts="1">
+<p:presentation xmlns:a="http://schemas.openxmlformats.org/drawingml/2006/main" xmlns:r="http://schemas.openxmlformats.org/officeDocument/2006/relationships" xmlns:p="http://schemas.openxmlformats.org/presentationml/2006/main">
   <p:sldMasterIdLst>
     <p:sldMasterId id="2147483648" r:id="rId1"/>
   </p:sldMasterIdLst>
   <p:sldIdLst>
-    <p:sldId id="256" r:id="rId2"/>
-    <p:sldId id="257" r:id="rId3"/>
+    <p:sldId id="256" r:id="rId3"/>
+    <p:sldId id="257" r:id="rId4"/>
   </p:sldIdLst>
   <p:sldSz cx="12192000" cy="6858000"/>
   <p:notesSz cx="6858000" cy="9144000"/>
@@ -113,6 +113,11 @@
             <a:srgbClr val="A4A3A4"/>
           </p15:clr>
         </p15:guide>
+        <p15:guide id="2" orient="horz" pos="2160" userDrawn="1">
+          <p15:clr>
+            <a:srgbClr val="A4A3A4"/>
+          </p15:clr>
+        </p15:guide>
       </p15:sldGuideLst>
     </p:ext>
   </p:extLst>
@@ -138,13 +143,7 @@
       </p:grpSpPr>
       <p:sp>
         <p:nvSpPr>
-          <p:cNvPr id="2" name="Title 1">
-            <a:extLst>
-              <a:ext uri="{FF2B5EF4-FFF2-40B4-BE49-F238E27FC236}">
-                <a16:creationId xmlns:a16="http://schemas.microsoft.com/office/drawing/2014/main" id="{DF9B52C6-2A47-FC4E-DDB6-29EBDC183402}"/>
-              </a:ext>
-            </a:extLst>
-          </p:cNvPr>
+          <p:cNvPr id="2" name="Title 1"/>
           <p:cNvSpPr>
             <a:spLocks noGrp="1"/>
           </p:cNvSpPr>
@@ -170,18 +169,13 @@
               <a:rPr lang="en-US"/>
               <a:t>Click to edit Master title style</a:t>
             </a:r>
-          </a:p>
-        </p:txBody>
-      </p:sp>
-      <p:sp>
-        <p:nvSpPr>
-          <p:cNvPr id="3" name="Subtitle 2">
-            <a:extLst>
-              <a:ext uri="{FF2B5EF4-FFF2-40B4-BE49-F238E27FC236}">
-                <a16:creationId xmlns:a16="http://schemas.microsoft.com/office/drawing/2014/main" id="{B9118879-ACC3-B540-44B9-20FEB404A1ED}"/>
-              </a:ext>
-            </a:extLst>
-          </p:cNvPr>
+            <a:endParaRPr lang="en-US"/>
+          </a:p>
+        </p:txBody>
+      </p:sp>
+      <p:sp>
+        <p:nvSpPr>
+          <p:cNvPr id="3" name="Subtitle 2"/>
           <p:cNvSpPr>
             <a:spLocks noGrp="1"/>
           </p:cNvSpPr>
@@ -240,18 +234,13 @@
               <a:rPr lang="en-US"/>
               <a:t>Click to edit Master subtitle style</a:t>
             </a:r>
-          </a:p>
-        </p:txBody>
-      </p:sp>
-      <p:sp>
-        <p:nvSpPr>
-          <p:cNvPr id="4" name="Date Placeholder 3">
-            <a:extLst>
-              <a:ext uri="{FF2B5EF4-FFF2-40B4-BE49-F238E27FC236}">
-                <a16:creationId xmlns:a16="http://schemas.microsoft.com/office/drawing/2014/main" id="{852A39C1-9B07-010D-B392-F857BE75AF8C}"/>
-              </a:ext>
-            </a:extLst>
-          </p:cNvPr>
+            <a:endParaRPr lang="en-US"/>
+          </a:p>
+        </p:txBody>
+      </p:sp>
+      <p:sp>
+        <p:nvSpPr>
+          <p:cNvPr id="4" name="Date Placeholder 3"/>
           <p:cNvSpPr>
             <a:spLocks noGrp="1"/>
           </p:cNvSpPr>
@@ -266,7 +255,6 @@
           <a:p>
             <a:fld id="{E58F602B-0AE4-435B-8479-9B7FB981A42B}" type="datetimeFigureOut">
               <a:rPr lang="en-US" smtClean="0"/>
-              <a:t>6/17/2025</a:t>
             </a:fld>
             <a:endParaRPr lang="en-US"/>
           </a:p>
@@ -274,13 +262,7 @@
       </p:sp>
       <p:sp>
         <p:nvSpPr>
-          <p:cNvPr id="5" name="Footer Placeholder 4">
-            <a:extLst>
-              <a:ext uri="{FF2B5EF4-FFF2-40B4-BE49-F238E27FC236}">
-                <a16:creationId xmlns:a16="http://schemas.microsoft.com/office/drawing/2014/main" id="{4166CE71-3371-A6A5-D9E4-9D6933329920}"/>
-              </a:ext>
-            </a:extLst>
-          </p:cNvPr>
+          <p:cNvPr id="5" name="Footer Placeholder 4"/>
           <p:cNvSpPr>
             <a:spLocks noGrp="1"/>
           </p:cNvSpPr>
@@ -299,13 +281,7 @@
       </p:sp>
       <p:sp>
         <p:nvSpPr>
-          <p:cNvPr id="6" name="Slide Number Placeholder 5">
-            <a:extLst>
-              <a:ext uri="{FF2B5EF4-FFF2-40B4-BE49-F238E27FC236}">
-                <a16:creationId xmlns:a16="http://schemas.microsoft.com/office/drawing/2014/main" id="{C2CF9F0A-F0C2-3C9F-5E79-47284765E582}"/>
-              </a:ext>
-            </a:extLst>
-          </p:cNvPr>
+          <p:cNvPr id="6" name="Slide Number Placeholder 5"/>
           <p:cNvSpPr>
             <a:spLocks noGrp="1"/>
           </p:cNvSpPr>
@@ -320,18 +296,12 @@
           <a:p>
             <a:fld id="{22AEA1C5-4D84-4BB7-AD3B-90B0263C00E4}" type="slidenum">
               <a:rPr lang="en-US" smtClean="0"/>
-              <a:t>‹#›</a:t>
             </a:fld>
             <a:endParaRPr lang="en-US"/>
           </a:p>
         </p:txBody>
       </p:sp>
     </p:spTree>
-    <p:extLst>
-      <p:ext uri="{BB962C8B-B14F-4D97-AF65-F5344CB8AC3E}">
-        <p14:creationId xmlns:p14="http://schemas.microsoft.com/office/powerpoint/2010/main" val="1401128269"/>
-      </p:ext>
-    </p:extLst>
   </p:cSld>
   <p:clrMapOvr>
     <a:masterClrMapping/>
@@ -358,13 +328,7 @@
       </p:grpSpPr>
       <p:sp>
         <p:nvSpPr>
-          <p:cNvPr id="2" name="Title 1">
-            <a:extLst>
-              <a:ext uri="{FF2B5EF4-FFF2-40B4-BE49-F238E27FC236}">
-                <a16:creationId xmlns:a16="http://schemas.microsoft.com/office/drawing/2014/main" id="{F0642494-7C9E-13B4-A341-E0E5F25559F1}"/>
-              </a:ext>
-            </a:extLst>
-          </p:cNvPr>
+          <p:cNvPr id="2" name="Title 1"/>
           <p:cNvSpPr>
             <a:spLocks noGrp="1"/>
           </p:cNvSpPr>
@@ -381,18 +345,13 @@
               <a:rPr lang="en-US"/>
               <a:t>Click to edit Master title style</a:t>
             </a:r>
-          </a:p>
-        </p:txBody>
-      </p:sp>
-      <p:sp>
-        <p:nvSpPr>
-          <p:cNvPr id="3" name="Vertical Text Placeholder 2">
-            <a:extLst>
-              <a:ext uri="{FF2B5EF4-FFF2-40B4-BE49-F238E27FC236}">
-                <a16:creationId xmlns:a16="http://schemas.microsoft.com/office/drawing/2014/main" id="{B2D9897F-893F-54B8-F593-CAADB91AFBAD}"/>
-              </a:ext>
-            </a:extLst>
-          </p:cNvPr>
+            <a:endParaRPr lang="en-US"/>
+          </a:p>
+        </p:txBody>
+      </p:sp>
+      <p:sp>
+        <p:nvSpPr>
+          <p:cNvPr id="3" name="Vertical Text Placeholder 2"/>
           <p:cNvSpPr>
             <a:spLocks noGrp="1"/>
           </p:cNvSpPr>
@@ -410,6 +369,7 @@
               <a:rPr lang="en-US"/>
               <a:t>Click to edit Master text styles</a:t>
             </a:r>
+            <a:endParaRPr lang="en-US"/>
           </a:p>
           <a:p>
             <a:pPr lvl="1"/>
@@ -417,6 +377,7 @@
               <a:rPr lang="en-US"/>
               <a:t>Second level</a:t>
             </a:r>
+            <a:endParaRPr lang="en-US"/>
           </a:p>
           <a:p>
             <a:pPr lvl="2"/>
@@ -424,6 +385,7 @@
               <a:rPr lang="en-US"/>
               <a:t>Third level</a:t>
             </a:r>
+            <a:endParaRPr lang="en-US"/>
           </a:p>
           <a:p>
             <a:pPr lvl="3"/>
@@ -431,6 +393,7 @@
               <a:rPr lang="en-US"/>
               <a:t>Fourth level</a:t>
             </a:r>
+            <a:endParaRPr lang="en-US"/>
           </a:p>
           <a:p>
             <a:pPr lvl="4"/>
@@ -438,18 +401,13 @@
               <a:rPr lang="en-US"/>
               <a:t>Fifth level</a:t>
             </a:r>
-          </a:p>
-        </p:txBody>
-      </p:sp>
-      <p:sp>
-        <p:nvSpPr>
-          <p:cNvPr id="4" name="Date Placeholder 3">
-            <a:extLst>
-              <a:ext uri="{FF2B5EF4-FFF2-40B4-BE49-F238E27FC236}">
-                <a16:creationId xmlns:a16="http://schemas.microsoft.com/office/drawing/2014/main" id="{FE8EA55C-D6FE-64DE-8297-AFA5769869F2}"/>
-              </a:ext>
-            </a:extLst>
-          </p:cNvPr>
+            <a:endParaRPr lang="en-US"/>
+          </a:p>
+        </p:txBody>
+      </p:sp>
+      <p:sp>
+        <p:nvSpPr>
+          <p:cNvPr id="4" name="Date Placeholder 3"/>
           <p:cNvSpPr>
             <a:spLocks noGrp="1"/>
           </p:cNvSpPr>
@@ -464,7 +422,6 @@
           <a:p>
             <a:fld id="{E58F602B-0AE4-435B-8479-9B7FB981A42B}" type="datetimeFigureOut">
               <a:rPr lang="en-US" smtClean="0"/>
-              <a:t>6/17/2025</a:t>
             </a:fld>
             <a:endParaRPr lang="en-US"/>
           </a:p>
@@ -472,13 +429,7 @@
       </p:sp>
       <p:sp>
         <p:nvSpPr>
-          <p:cNvPr id="5" name="Footer Placeholder 4">
-            <a:extLst>
-              <a:ext uri="{FF2B5EF4-FFF2-40B4-BE49-F238E27FC236}">
-                <a16:creationId xmlns:a16="http://schemas.microsoft.com/office/drawing/2014/main" id="{C1E61209-5CB1-B774-4993-1136CC018FAE}"/>
-              </a:ext>
-            </a:extLst>
-          </p:cNvPr>
+          <p:cNvPr id="5" name="Footer Placeholder 4"/>
           <p:cNvSpPr>
             <a:spLocks noGrp="1"/>
           </p:cNvSpPr>
@@ -497,13 +448,7 @@
       </p:sp>
       <p:sp>
         <p:nvSpPr>
-          <p:cNvPr id="6" name="Slide Number Placeholder 5">
-            <a:extLst>
-              <a:ext uri="{FF2B5EF4-FFF2-40B4-BE49-F238E27FC236}">
-                <a16:creationId xmlns:a16="http://schemas.microsoft.com/office/drawing/2014/main" id="{EEC247FD-B597-23D8-ADF7-28DE1C002F1C}"/>
-              </a:ext>
-            </a:extLst>
-          </p:cNvPr>
+          <p:cNvPr id="6" name="Slide Number Placeholder 5"/>
           <p:cNvSpPr>
             <a:spLocks noGrp="1"/>
           </p:cNvSpPr>
@@ -518,18 +463,12 @@
           <a:p>
             <a:fld id="{22AEA1C5-4D84-4BB7-AD3B-90B0263C00E4}" type="slidenum">
               <a:rPr lang="en-US" smtClean="0"/>
-              <a:t>‹#›</a:t>
             </a:fld>
             <a:endParaRPr lang="en-US"/>
           </a:p>
         </p:txBody>
       </p:sp>
     </p:spTree>
-    <p:extLst>
-      <p:ext uri="{BB962C8B-B14F-4D97-AF65-F5344CB8AC3E}">
-        <p14:creationId xmlns:p14="http://schemas.microsoft.com/office/powerpoint/2010/main" val="2675860695"/>
-      </p:ext>
-    </p:extLst>
   </p:cSld>
   <p:clrMapOvr>
     <a:masterClrMapping/>
@@ -556,13 +495,7 @@
       </p:grpSpPr>
       <p:sp>
         <p:nvSpPr>
-          <p:cNvPr id="2" name="Vertical Title 1">
-            <a:extLst>
-              <a:ext uri="{FF2B5EF4-FFF2-40B4-BE49-F238E27FC236}">
-                <a16:creationId xmlns:a16="http://schemas.microsoft.com/office/drawing/2014/main" id="{6473CC4B-B194-3677-4B72-2DE51F6186CE}"/>
-              </a:ext>
-            </a:extLst>
-          </p:cNvPr>
+          <p:cNvPr id="2" name="Vertical Title 1"/>
           <p:cNvSpPr>
             <a:spLocks noGrp="1"/>
           </p:cNvSpPr>
@@ -584,18 +517,13 @@
               <a:rPr lang="en-US"/>
               <a:t>Click to edit Master title style</a:t>
             </a:r>
-          </a:p>
-        </p:txBody>
-      </p:sp>
-      <p:sp>
-        <p:nvSpPr>
-          <p:cNvPr id="3" name="Vertical Text Placeholder 2">
-            <a:extLst>
-              <a:ext uri="{FF2B5EF4-FFF2-40B4-BE49-F238E27FC236}">
-                <a16:creationId xmlns:a16="http://schemas.microsoft.com/office/drawing/2014/main" id="{19D03A7A-3032-6FB8-79A0-4516F3952940}"/>
-              </a:ext>
-            </a:extLst>
-          </p:cNvPr>
+            <a:endParaRPr lang="en-US"/>
+          </a:p>
+        </p:txBody>
+      </p:sp>
+      <p:sp>
+        <p:nvSpPr>
+          <p:cNvPr id="3" name="Vertical Text Placeholder 2"/>
           <p:cNvSpPr>
             <a:spLocks noGrp="1"/>
           </p:cNvSpPr>
@@ -618,6 +546,7 @@
               <a:rPr lang="en-US"/>
               <a:t>Click to edit Master text styles</a:t>
             </a:r>
+            <a:endParaRPr lang="en-US"/>
           </a:p>
           <a:p>
             <a:pPr lvl="1"/>
@@ -625,6 +554,7 @@
               <a:rPr lang="en-US"/>
               <a:t>Second level</a:t>
             </a:r>
+            <a:endParaRPr lang="en-US"/>
           </a:p>
           <a:p>
             <a:pPr lvl="2"/>
@@ -632,6 +562,7 @@
               <a:rPr lang="en-US"/>
               <a:t>Third level</a:t>
             </a:r>
+            <a:endParaRPr lang="en-US"/>
           </a:p>
           <a:p>
             <a:pPr lvl="3"/>
@@ -639,6 +570,7 @@
               <a:rPr lang="en-US"/>
               <a:t>Fourth level</a:t>
             </a:r>
+            <a:endParaRPr lang="en-US"/>
           </a:p>
           <a:p>
             <a:pPr lvl="4"/>
@@ -646,18 +578,13 @@
               <a:rPr lang="en-US"/>
               <a:t>Fifth level</a:t>
             </a:r>
-          </a:p>
-        </p:txBody>
-      </p:sp>
-      <p:sp>
-        <p:nvSpPr>
-          <p:cNvPr id="4" name="Date Placeholder 3">
-            <a:extLst>
-              <a:ext uri="{FF2B5EF4-FFF2-40B4-BE49-F238E27FC236}">
-                <a16:creationId xmlns:a16="http://schemas.microsoft.com/office/drawing/2014/main" id="{6CEEF719-04A5-DBBD-3CBB-DE9D8405EB11}"/>
-              </a:ext>
-            </a:extLst>
-          </p:cNvPr>
+            <a:endParaRPr lang="en-US"/>
+          </a:p>
+        </p:txBody>
+      </p:sp>
+      <p:sp>
+        <p:nvSpPr>
+          <p:cNvPr id="4" name="Date Placeholder 3"/>
           <p:cNvSpPr>
             <a:spLocks noGrp="1"/>
           </p:cNvSpPr>
@@ -672,7 +599,6 @@
           <a:p>
             <a:fld id="{E58F602B-0AE4-435B-8479-9B7FB981A42B}" type="datetimeFigureOut">
               <a:rPr lang="en-US" smtClean="0"/>
-              <a:t>6/17/2025</a:t>
             </a:fld>
             <a:endParaRPr lang="en-US"/>
           </a:p>
@@ -680,13 +606,7 @@
       </p:sp>
       <p:sp>
         <p:nvSpPr>
-          <p:cNvPr id="5" name="Footer Placeholder 4">
-            <a:extLst>
-              <a:ext uri="{FF2B5EF4-FFF2-40B4-BE49-F238E27FC236}">
-                <a16:creationId xmlns:a16="http://schemas.microsoft.com/office/drawing/2014/main" id="{56F48885-75FD-3B4E-F329-47E086AA3600}"/>
-              </a:ext>
-            </a:extLst>
-          </p:cNvPr>
+          <p:cNvPr id="5" name="Footer Placeholder 4"/>
           <p:cNvSpPr>
             <a:spLocks noGrp="1"/>
           </p:cNvSpPr>
@@ -705,13 +625,7 @@
       </p:sp>
       <p:sp>
         <p:nvSpPr>
-          <p:cNvPr id="6" name="Slide Number Placeholder 5">
-            <a:extLst>
-              <a:ext uri="{FF2B5EF4-FFF2-40B4-BE49-F238E27FC236}">
-                <a16:creationId xmlns:a16="http://schemas.microsoft.com/office/drawing/2014/main" id="{58F59D78-DEB8-5D1F-6AD0-F8165569F794}"/>
-              </a:ext>
-            </a:extLst>
-          </p:cNvPr>
+          <p:cNvPr id="6" name="Slide Number Placeholder 5"/>
           <p:cNvSpPr>
             <a:spLocks noGrp="1"/>
           </p:cNvSpPr>
@@ -726,18 +640,12 @@
           <a:p>
             <a:fld id="{22AEA1C5-4D84-4BB7-AD3B-90B0263C00E4}" type="slidenum">
               <a:rPr lang="en-US" smtClean="0"/>
-              <a:t>‹#›</a:t>
             </a:fld>
             <a:endParaRPr lang="en-US"/>
           </a:p>
         </p:txBody>
       </p:sp>
     </p:spTree>
-    <p:extLst>
-      <p:ext uri="{BB962C8B-B14F-4D97-AF65-F5344CB8AC3E}">
-        <p14:creationId xmlns:p14="http://schemas.microsoft.com/office/powerpoint/2010/main" val="2400941228"/>
-      </p:ext>
-    </p:extLst>
   </p:cSld>
   <p:clrMapOvr>
     <a:masterClrMapping/>
@@ -764,13 +672,7 @@
       </p:grpSpPr>
       <p:sp>
         <p:nvSpPr>
-          <p:cNvPr id="2" name="Title 1">
-            <a:extLst>
-              <a:ext uri="{FF2B5EF4-FFF2-40B4-BE49-F238E27FC236}">
-                <a16:creationId xmlns:a16="http://schemas.microsoft.com/office/drawing/2014/main" id="{E9974D01-9A97-4899-1C8E-29C1DCFD44D0}"/>
-              </a:ext>
-            </a:extLst>
-          </p:cNvPr>
+          <p:cNvPr id="2" name="Title 1"/>
           <p:cNvSpPr>
             <a:spLocks noGrp="1"/>
           </p:cNvSpPr>
@@ -787,18 +689,13 @@
               <a:rPr lang="en-US"/>
               <a:t>Click to edit Master title style</a:t>
             </a:r>
-          </a:p>
-        </p:txBody>
-      </p:sp>
-      <p:sp>
-        <p:nvSpPr>
-          <p:cNvPr id="3" name="Content Placeholder 2">
-            <a:extLst>
-              <a:ext uri="{FF2B5EF4-FFF2-40B4-BE49-F238E27FC236}">
-                <a16:creationId xmlns:a16="http://schemas.microsoft.com/office/drawing/2014/main" id="{FE79887A-733F-4C76-8A4E-D40923388297}"/>
-              </a:ext>
-            </a:extLst>
-          </p:cNvPr>
+            <a:endParaRPr lang="en-US"/>
+          </a:p>
+        </p:txBody>
+      </p:sp>
+      <p:sp>
+        <p:nvSpPr>
+          <p:cNvPr id="3" name="Content Placeholder 2"/>
           <p:cNvSpPr>
             <a:spLocks noGrp="1"/>
           </p:cNvSpPr>
@@ -816,6 +713,7 @@
               <a:rPr lang="en-US"/>
               <a:t>Click to edit Master text styles</a:t>
             </a:r>
+            <a:endParaRPr lang="en-US"/>
           </a:p>
           <a:p>
             <a:pPr lvl="1"/>
@@ -823,6 +721,7 @@
               <a:rPr lang="en-US"/>
               <a:t>Second level</a:t>
             </a:r>
+            <a:endParaRPr lang="en-US"/>
           </a:p>
           <a:p>
             <a:pPr lvl="2"/>
@@ -830,6 +729,7 @@
               <a:rPr lang="en-US"/>
               <a:t>Third level</a:t>
             </a:r>
+            <a:endParaRPr lang="en-US"/>
           </a:p>
           <a:p>
             <a:pPr lvl="3"/>
@@ -837,6 +737,7 @@
               <a:rPr lang="en-US"/>
               <a:t>Fourth level</a:t>
             </a:r>
+            <a:endParaRPr lang="en-US"/>
           </a:p>
           <a:p>
             <a:pPr lvl="4"/>
@@ -844,18 +745,13 @@
               <a:rPr lang="en-US"/>
               <a:t>Fifth level</a:t>
             </a:r>
-          </a:p>
-        </p:txBody>
-      </p:sp>
-      <p:sp>
-        <p:nvSpPr>
-          <p:cNvPr id="4" name="Date Placeholder 3">
-            <a:extLst>
-              <a:ext uri="{FF2B5EF4-FFF2-40B4-BE49-F238E27FC236}">
-                <a16:creationId xmlns:a16="http://schemas.microsoft.com/office/drawing/2014/main" id="{A99CF775-5DA4-F654-F87B-2A10C1287CD8}"/>
-              </a:ext>
-            </a:extLst>
-          </p:cNvPr>
+            <a:endParaRPr lang="en-US"/>
+          </a:p>
+        </p:txBody>
+      </p:sp>
+      <p:sp>
+        <p:nvSpPr>
+          <p:cNvPr id="4" name="Date Placeholder 3"/>
           <p:cNvSpPr>
             <a:spLocks noGrp="1"/>
           </p:cNvSpPr>
@@ -870,7 +766,6 @@
           <a:p>
             <a:fld id="{E58F602B-0AE4-435B-8479-9B7FB981A42B}" type="datetimeFigureOut">
               <a:rPr lang="en-US" smtClean="0"/>
-              <a:t>6/17/2025</a:t>
             </a:fld>
             <a:endParaRPr lang="en-US"/>
           </a:p>
@@ -878,13 +773,7 @@
       </p:sp>
       <p:sp>
         <p:nvSpPr>
-          <p:cNvPr id="5" name="Footer Placeholder 4">
-            <a:extLst>
-              <a:ext uri="{FF2B5EF4-FFF2-40B4-BE49-F238E27FC236}">
-                <a16:creationId xmlns:a16="http://schemas.microsoft.com/office/drawing/2014/main" id="{C687C2D2-E2FE-83B7-72F4-EC3F66E3ED9F}"/>
-              </a:ext>
-            </a:extLst>
-          </p:cNvPr>
+          <p:cNvPr id="5" name="Footer Placeholder 4"/>
           <p:cNvSpPr>
             <a:spLocks noGrp="1"/>
           </p:cNvSpPr>
@@ -903,13 +792,7 @@
       </p:sp>
       <p:sp>
         <p:nvSpPr>
-          <p:cNvPr id="6" name="Slide Number Placeholder 5">
-            <a:extLst>
-              <a:ext uri="{FF2B5EF4-FFF2-40B4-BE49-F238E27FC236}">
-                <a16:creationId xmlns:a16="http://schemas.microsoft.com/office/drawing/2014/main" id="{761B5D8B-9566-3424-7DDC-3FDB62DFA9C5}"/>
-              </a:ext>
-            </a:extLst>
-          </p:cNvPr>
+          <p:cNvPr id="6" name="Slide Number Placeholder 5"/>
           <p:cNvSpPr>
             <a:spLocks noGrp="1"/>
           </p:cNvSpPr>
@@ -924,18 +807,12 @@
           <a:p>
             <a:fld id="{22AEA1C5-4D84-4BB7-AD3B-90B0263C00E4}" type="slidenum">
               <a:rPr lang="en-US" smtClean="0"/>
-              <a:t>‹#›</a:t>
             </a:fld>
             <a:endParaRPr lang="en-US"/>
           </a:p>
         </p:txBody>
       </p:sp>
     </p:spTree>
-    <p:extLst>
-      <p:ext uri="{BB962C8B-B14F-4D97-AF65-F5344CB8AC3E}">
-        <p14:creationId xmlns:p14="http://schemas.microsoft.com/office/powerpoint/2010/main" val="3321765423"/>
-      </p:ext>
-    </p:extLst>
   </p:cSld>
   <p:clrMapOvr>
     <a:masterClrMapping/>
@@ -962,13 +839,7 @@
       </p:grpSpPr>
       <p:sp>
         <p:nvSpPr>
-          <p:cNvPr id="2" name="Title 1">
-            <a:extLst>
-              <a:ext uri="{FF2B5EF4-FFF2-40B4-BE49-F238E27FC236}">
-                <a16:creationId xmlns:a16="http://schemas.microsoft.com/office/drawing/2014/main" id="{17836B48-BABB-28F0-C40B-225893348770}"/>
-              </a:ext>
-            </a:extLst>
-          </p:cNvPr>
+          <p:cNvPr id="2" name="Title 1"/>
           <p:cNvSpPr>
             <a:spLocks noGrp="1"/>
           </p:cNvSpPr>
@@ -994,18 +865,13 @@
               <a:rPr lang="en-US"/>
               <a:t>Click to edit Master title style</a:t>
             </a:r>
-          </a:p>
-        </p:txBody>
-      </p:sp>
-      <p:sp>
-        <p:nvSpPr>
-          <p:cNvPr id="3" name="Text Placeholder 2">
-            <a:extLst>
-              <a:ext uri="{FF2B5EF4-FFF2-40B4-BE49-F238E27FC236}">
-                <a16:creationId xmlns:a16="http://schemas.microsoft.com/office/drawing/2014/main" id="{DAD62E22-3B15-E270-4B65-0CCD0E5578B3}"/>
-              </a:ext>
-            </a:extLst>
-          </p:cNvPr>
+            <a:endParaRPr lang="en-US"/>
+          </a:p>
+        </p:txBody>
+      </p:sp>
+      <p:sp>
+        <p:nvSpPr>
+          <p:cNvPr id="3" name="Text Placeholder 2"/>
           <p:cNvSpPr>
             <a:spLocks noGrp="1"/>
           </p:cNvSpPr>
@@ -1119,18 +985,13 @@
               <a:rPr lang="en-US"/>
               <a:t>Click to edit Master text styles</a:t>
             </a:r>
-          </a:p>
-        </p:txBody>
-      </p:sp>
-      <p:sp>
-        <p:nvSpPr>
-          <p:cNvPr id="4" name="Date Placeholder 3">
-            <a:extLst>
-              <a:ext uri="{FF2B5EF4-FFF2-40B4-BE49-F238E27FC236}">
-                <a16:creationId xmlns:a16="http://schemas.microsoft.com/office/drawing/2014/main" id="{594AB384-2DB8-45E2-642D-A5E893F8C74E}"/>
-              </a:ext>
-            </a:extLst>
-          </p:cNvPr>
+            <a:endParaRPr lang="en-US"/>
+          </a:p>
+        </p:txBody>
+      </p:sp>
+      <p:sp>
+        <p:nvSpPr>
+          <p:cNvPr id="4" name="Date Placeholder 3"/>
           <p:cNvSpPr>
             <a:spLocks noGrp="1"/>
           </p:cNvSpPr>
@@ -1145,7 +1006,6 @@
           <a:p>
             <a:fld id="{E58F602B-0AE4-435B-8479-9B7FB981A42B}" type="datetimeFigureOut">
               <a:rPr lang="en-US" smtClean="0"/>
-              <a:t>6/17/2025</a:t>
             </a:fld>
             <a:endParaRPr lang="en-US"/>
           </a:p>
@@ -1153,13 +1013,7 @@
       </p:sp>
       <p:sp>
         <p:nvSpPr>
-          <p:cNvPr id="5" name="Footer Placeholder 4">
-            <a:extLst>
-              <a:ext uri="{FF2B5EF4-FFF2-40B4-BE49-F238E27FC236}">
-                <a16:creationId xmlns:a16="http://schemas.microsoft.com/office/drawing/2014/main" id="{9F30EED4-DA2B-5766-C016-3829D193918C}"/>
-              </a:ext>
-            </a:extLst>
-          </p:cNvPr>
+          <p:cNvPr id="5" name="Footer Placeholder 4"/>
           <p:cNvSpPr>
             <a:spLocks noGrp="1"/>
           </p:cNvSpPr>
@@ -1178,13 +1032,7 @@
       </p:sp>
       <p:sp>
         <p:nvSpPr>
-          <p:cNvPr id="6" name="Slide Number Placeholder 5">
-            <a:extLst>
-              <a:ext uri="{FF2B5EF4-FFF2-40B4-BE49-F238E27FC236}">
-                <a16:creationId xmlns:a16="http://schemas.microsoft.com/office/drawing/2014/main" id="{35BADCDB-8F19-EA0E-D46F-365A393D430F}"/>
-              </a:ext>
-            </a:extLst>
-          </p:cNvPr>
+          <p:cNvPr id="6" name="Slide Number Placeholder 5"/>
           <p:cNvSpPr>
             <a:spLocks noGrp="1"/>
           </p:cNvSpPr>
@@ -1199,18 +1047,12 @@
           <a:p>
             <a:fld id="{22AEA1C5-4D84-4BB7-AD3B-90B0263C00E4}" type="slidenum">
               <a:rPr lang="en-US" smtClean="0"/>
-              <a:t>‹#›</a:t>
             </a:fld>
             <a:endParaRPr lang="en-US"/>
           </a:p>
         </p:txBody>
       </p:sp>
     </p:spTree>
-    <p:extLst>
-      <p:ext uri="{BB962C8B-B14F-4D97-AF65-F5344CB8AC3E}">
-        <p14:creationId xmlns:p14="http://schemas.microsoft.com/office/powerpoint/2010/main" val="2038133870"/>
-      </p:ext>
-    </p:extLst>
   </p:cSld>
   <p:clrMapOvr>
     <a:masterClrMapping/>
@@ -1237,13 +1079,7 @@
       </p:grpSpPr>
       <p:sp>
         <p:nvSpPr>
-          <p:cNvPr id="2" name="Title 1">
-            <a:extLst>
-              <a:ext uri="{FF2B5EF4-FFF2-40B4-BE49-F238E27FC236}">
-                <a16:creationId xmlns:a16="http://schemas.microsoft.com/office/drawing/2014/main" id="{9D7E5591-44E6-7A79-5D10-F03505ABF9EE}"/>
-              </a:ext>
-            </a:extLst>
-          </p:cNvPr>
+          <p:cNvPr id="2" name="Title 1"/>
           <p:cNvSpPr>
             <a:spLocks noGrp="1"/>
           </p:cNvSpPr>
@@ -1260,18 +1096,13 @@
               <a:rPr lang="en-US"/>
               <a:t>Click to edit Master title style</a:t>
             </a:r>
-          </a:p>
-        </p:txBody>
-      </p:sp>
-      <p:sp>
-        <p:nvSpPr>
-          <p:cNvPr id="3" name="Content Placeholder 2">
-            <a:extLst>
-              <a:ext uri="{FF2B5EF4-FFF2-40B4-BE49-F238E27FC236}">
-                <a16:creationId xmlns:a16="http://schemas.microsoft.com/office/drawing/2014/main" id="{784D4F7E-1AD2-0E7B-56CE-5DF5CD7B089A}"/>
-              </a:ext>
-            </a:extLst>
-          </p:cNvPr>
+            <a:endParaRPr lang="en-US"/>
+          </a:p>
+        </p:txBody>
+      </p:sp>
+      <p:sp>
+        <p:nvSpPr>
+          <p:cNvPr id="3" name="Content Placeholder 2"/>
           <p:cNvSpPr>
             <a:spLocks noGrp="1"/>
           </p:cNvSpPr>
@@ -1294,6 +1125,7 @@
               <a:rPr lang="en-US"/>
               <a:t>Click to edit Master text styles</a:t>
             </a:r>
+            <a:endParaRPr lang="en-US"/>
           </a:p>
           <a:p>
             <a:pPr lvl="1"/>
@@ -1301,6 +1133,7 @@
               <a:rPr lang="en-US"/>
               <a:t>Second level</a:t>
             </a:r>
+            <a:endParaRPr lang="en-US"/>
           </a:p>
           <a:p>
             <a:pPr lvl="2"/>
@@ -1308,6 +1141,7 @@
               <a:rPr lang="en-US"/>
               <a:t>Third level</a:t>
             </a:r>
+            <a:endParaRPr lang="en-US"/>
           </a:p>
           <a:p>
             <a:pPr lvl="3"/>
@@ -1315,6 +1149,7 @@
               <a:rPr lang="en-US"/>
               <a:t>Fourth level</a:t>
             </a:r>
+            <a:endParaRPr lang="en-US"/>
           </a:p>
           <a:p>
             <a:pPr lvl="4"/>
@@ -1322,18 +1157,13 @@
               <a:rPr lang="en-US"/>
               <a:t>Fifth level</a:t>
             </a:r>
-          </a:p>
-        </p:txBody>
-      </p:sp>
-      <p:sp>
-        <p:nvSpPr>
-          <p:cNvPr id="4" name="Content Placeholder 3">
-            <a:extLst>
-              <a:ext uri="{FF2B5EF4-FFF2-40B4-BE49-F238E27FC236}">
-                <a16:creationId xmlns:a16="http://schemas.microsoft.com/office/drawing/2014/main" id="{A2189B84-8054-F5D7-24B7-6AABF3A7EC04}"/>
-              </a:ext>
-            </a:extLst>
-          </p:cNvPr>
+            <a:endParaRPr lang="en-US"/>
+          </a:p>
+        </p:txBody>
+      </p:sp>
+      <p:sp>
+        <p:nvSpPr>
+          <p:cNvPr id="4" name="Content Placeholder 3"/>
           <p:cNvSpPr>
             <a:spLocks noGrp="1"/>
           </p:cNvSpPr>
@@ -1356,6 +1186,7 @@
               <a:rPr lang="en-US"/>
               <a:t>Click to edit Master text styles</a:t>
             </a:r>
+            <a:endParaRPr lang="en-US"/>
           </a:p>
           <a:p>
             <a:pPr lvl="1"/>
@@ -1363,6 +1194,7 @@
               <a:rPr lang="en-US"/>
               <a:t>Second level</a:t>
             </a:r>
+            <a:endParaRPr lang="en-US"/>
           </a:p>
           <a:p>
             <a:pPr lvl="2"/>
@@ -1370,6 +1202,7 @@
               <a:rPr lang="en-US"/>
               <a:t>Third level</a:t>
             </a:r>
+            <a:endParaRPr lang="en-US"/>
           </a:p>
           <a:p>
             <a:pPr lvl="3"/>
@@ -1377,6 +1210,7 @@
               <a:rPr lang="en-US"/>
               <a:t>Fourth level</a:t>
             </a:r>
+            <a:endParaRPr lang="en-US"/>
           </a:p>
           <a:p>
             <a:pPr lvl="4"/>
@@ -1384,18 +1218,13 @@
               <a:rPr lang="en-US"/>
               <a:t>Fifth level</a:t>
             </a:r>
-          </a:p>
-        </p:txBody>
-      </p:sp>
-      <p:sp>
-        <p:nvSpPr>
-          <p:cNvPr id="5" name="Date Placeholder 4">
-            <a:extLst>
-              <a:ext uri="{FF2B5EF4-FFF2-40B4-BE49-F238E27FC236}">
-                <a16:creationId xmlns:a16="http://schemas.microsoft.com/office/drawing/2014/main" id="{5449E577-B84B-4541-3570-ED96C6503337}"/>
-              </a:ext>
-            </a:extLst>
-          </p:cNvPr>
+            <a:endParaRPr lang="en-US"/>
+          </a:p>
+        </p:txBody>
+      </p:sp>
+      <p:sp>
+        <p:nvSpPr>
+          <p:cNvPr id="5" name="Date Placeholder 4"/>
           <p:cNvSpPr>
             <a:spLocks noGrp="1"/>
           </p:cNvSpPr>
@@ -1410,7 +1239,6 @@
           <a:p>
             <a:fld id="{E58F602B-0AE4-435B-8479-9B7FB981A42B}" type="datetimeFigureOut">
               <a:rPr lang="en-US" smtClean="0"/>
-              <a:t>6/17/2025</a:t>
             </a:fld>
             <a:endParaRPr lang="en-US"/>
           </a:p>
@@ -1418,13 +1246,7 @@
       </p:sp>
       <p:sp>
         <p:nvSpPr>
-          <p:cNvPr id="6" name="Footer Placeholder 5">
-            <a:extLst>
-              <a:ext uri="{FF2B5EF4-FFF2-40B4-BE49-F238E27FC236}">
-                <a16:creationId xmlns:a16="http://schemas.microsoft.com/office/drawing/2014/main" id="{D38DF050-4872-A553-5673-8A3E343A7456}"/>
-              </a:ext>
-            </a:extLst>
-          </p:cNvPr>
+          <p:cNvPr id="6" name="Footer Placeholder 5"/>
           <p:cNvSpPr>
             <a:spLocks noGrp="1"/>
           </p:cNvSpPr>
@@ -1443,13 +1265,7 @@
       </p:sp>
       <p:sp>
         <p:nvSpPr>
-          <p:cNvPr id="7" name="Slide Number Placeholder 6">
-            <a:extLst>
-              <a:ext uri="{FF2B5EF4-FFF2-40B4-BE49-F238E27FC236}">
-                <a16:creationId xmlns:a16="http://schemas.microsoft.com/office/drawing/2014/main" id="{D56C1213-CA2A-7447-9B90-7C25D04A32E4}"/>
-              </a:ext>
-            </a:extLst>
-          </p:cNvPr>
+          <p:cNvPr id="7" name="Slide Number Placeholder 6"/>
           <p:cNvSpPr>
             <a:spLocks noGrp="1"/>
           </p:cNvSpPr>
@@ -1464,18 +1280,12 @@
           <a:p>
             <a:fld id="{22AEA1C5-4D84-4BB7-AD3B-90B0263C00E4}" type="slidenum">
               <a:rPr lang="en-US" smtClean="0"/>
-              <a:t>‹#›</a:t>
             </a:fld>
             <a:endParaRPr lang="en-US"/>
           </a:p>
         </p:txBody>
       </p:sp>
     </p:spTree>
-    <p:extLst>
-      <p:ext uri="{BB962C8B-B14F-4D97-AF65-F5344CB8AC3E}">
-        <p14:creationId xmlns:p14="http://schemas.microsoft.com/office/powerpoint/2010/main" val="3407231010"/>
-      </p:ext>
-    </p:extLst>
   </p:cSld>
   <p:clrMapOvr>
     <a:masterClrMapping/>
@@ -1502,13 +1312,7 @@
       </p:grpSpPr>
       <p:sp>
         <p:nvSpPr>
-          <p:cNvPr id="2" name="Title 1">
-            <a:extLst>
-              <a:ext uri="{FF2B5EF4-FFF2-40B4-BE49-F238E27FC236}">
-                <a16:creationId xmlns:a16="http://schemas.microsoft.com/office/drawing/2014/main" id="{F48DFE54-DA79-6148-AFDD-51D0511FB6CD}"/>
-              </a:ext>
-            </a:extLst>
-          </p:cNvPr>
+          <p:cNvPr id="2" name="Title 1"/>
           <p:cNvSpPr>
             <a:spLocks noGrp="1"/>
           </p:cNvSpPr>
@@ -1530,18 +1334,13 @@
               <a:rPr lang="en-US"/>
               <a:t>Click to edit Master title style</a:t>
             </a:r>
-          </a:p>
-        </p:txBody>
-      </p:sp>
-      <p:sp>
-        <p:nvSpPr>
-          <p:cNvPr id="3" name="Text Placeholder 2">
-            <a:extLst>
-              <a:ext uri="{FF2B5EF4-FFF2-40B4-BE49-F238E27FC236}">
-                <a16:creationId xmlns:a16="http://schemas.microsoft.com/office/drawing/2014/main" id="{8D7C8934-012E-516F-56C6-1567F7C432DB}"/>
-              </a:ext>
-            </a:extLst>
-          </p:cNvPr>
+            <a:endParaRPr lang="en-US"/>
+          </a:p>
+        </p:txBody>
+      </p:sp>
+      <p:sp>
+        <p:nvSpPr>
+          <p:cNvPr id="3" name="Text Placeholder 2"/>
           <p:cNvSpPr>
             <a:spLocks noGrp="1"/>
           </p:cNvSpPr>
@@ -1601,18 +1400,13 @@
               <a:rPr lang="en-US"/>
               <a:t>Click to edit Master text styles</a:t>
             </a:r>
-          </a:p>
-        </p:txBody>
-      </p:sp>
-      <p:sp>
-        <p:nvSpPr>
-          <p:cNvPr id="4" name="Content Placeholder 3">
-            <a:extLst>
-              <a:ext uri="{FF2B5EF4-FFF2-40B4-BE49-F238E27FC236}">
-                <a16:creationId xmlns:a16="http://schemas.microsoft.com/office/drawing/2014/main" id="{5A5A1172-F9F0-90AF-F625-EFEBBA19D7F0}"/>
-              </a:ext>
-            </a:extLst>
-          </p:cNvPr>
+            <a:endParaRPr lang="en-US"/>
+          </a:p>
+        </p:txBody>
+      </p:sp>
+      <p:sp>
+        <p:nvSpPr>
+          <p:cNvPr id="4" name="Content Placeholder 3"/>
           <p:cNvSpPr>
             <a:spLocks noGrp="1"/>
           </p:cNvSpPr>
@@ -1635,6 +1429,7 @@
               <a:rPr lang="en-US"/>
               <a:t>Click to edit Master text styles</a:t>
             </a:r>
+            <a:endParaRPr lang="en-US"/>
           </a:p>
           <a:p>
             <a:pPr lvl="1"/>
@@ -1642,6 +1437,7 @@
               <a:rPr lang="en-US"/>
               <a:t>Second level</a:t>
             </a:r>
+            <a:endParaRPr lang="en-US"/>
           </a:p>
           <a:p>
             <a:pPr lvl="2"/>
@@ -1649,6 +1445,7 @@
               <a:rPr lang="en-US"/>
               <a:t>Third level</a:t>
             </a:r>
+            <a:endParaRPr lang="en-US"/>
           </a:p>
           <a:p>
             <a:pPr lvl="3"/>
@@ -1656,6 +1453,7 @@
               <a:rPr lang="en-US"/>
               <a:t>Fourth level</a:t>
             </a:r>
+            <a:endParaRPr lang="en-US"/>
           </a:p>
           <a:p>
             <a:pPr lvl="4"/>
@@ -1663,18 +1461,13 @@
               <a:rPr lang="en-US"/>
               <a:t>Fifth level</a:t>
             </a:r>
-          </a:p>
-        </p:txBody>
-      </p:sp>
-      <p:sp>
-        <p:nvSpPr>
-          <p:cNvPr id="5" name="Text Placeholder 4">
-            <a:extLst>
-              <a:ext uri="{FF2B5EF4-FFF2-40B4-BE49-F238E27FC236}">
-                <a16:creationId xmlns:a16="http://schemas.microsoft.com/office/drawing/2014/main" id="{01595FD3-5E07-7747-6811-1FF940F94D70}"/>
-              </a:ext>
-            </a:extLst>
-          </p:cNvPr>
+            <a:endParaRPr lang="en-US"/>
+          </a:p>
+        </p:txBody>
+      </p:sp>
+      <p:sp>
+        <p:nvSpPr>
+          <p:cNvPr id="5" name="Text Placeholder 4"/>
           <p:cNvSpPr>
             <a:spLocks noGrp="1"/>
           </p:cNvSpPr>
@@ -1734,18 +1527,13 @@
               <a:rPr lang="en-US"/>
               <a:t>Click to edit Master text styles</a:t>
             </a:r>
-          </a:p>
-        </p:txBody>
-      </p:sp>
-      <p:sp>
-        <p:nvSpPr>
-          <p:cNvPr id="6" name="Content Placeholder 5">
-            <a:extLst>
-              <a:ext uri="{FF2B5EF4-FFF2-40B4-BE49-F238E27FC236}">
-                <a16:creationId xmlns:a16="http://schemas.microsoft.com/office/drawing/2014/main" id="{0F5F5E13-BDE9-889B-C809-FC8C84657C0C}"/>
-              </a:ext>
-            </a:extLst>
-          </p:cNvPr>
+            <a:endParaRPr lang="en-US"/>
+          </a:p>
+        </p:txBody>
+      </p:sp>
+      <p:sp>
+        <p:nvSpPr>
+          <p:cNvPr id="6" name="Content Placeholder 5"/>
           <p:cNvSpPr>
             <a:spLocks noGrp="1"/>
           </p:cNvSpPr>
@@ -1768,6 +1556,7 @@
               <a:rPr lang="en-US"/>
               <a:t>Click to edit Master text styles</a:t>
             </a:r>
+            <a:endParaRPr lang="en-US"/>
           </a:p>
           <a:p>
             <a:pPr lvl="1"/>
@@ -1775,6 +1564,7 @@
               <a:rPr lang="en-US"/>
               <a:t>Second level</a:t>
             </a:r>
+            <a:endParaRPr lang="en-US"/>
           </a:p>
           <a:p>
             <a:pPr lvl="2"/>
@@ -1782,6 +1572,7 @@
               <a:rPr lang="en-US"/>
               <a:t>Third level</a:t>
             </a:r>
+            <a:endParaRPr lang="en-US"/>
           </a:p>
           <a:p>
             <a:pPr lvl="3"/>
@@ -1789,6 +1580,7 @@
               <a:rPr lang="en-US"/>
               <a:t>Fourth level</a:t>
             </a:r>
+            <a:endParaRPr lang="en-US"/>
           </a:p>
           <a:p>
             <a:pPr lvl="4"/>
@@ -1796,18 +1588,13 @@
               <a:rPr lang="en-US"/>
               <a:t>Fifth level</a:t>
             </a:r>
-          </a:p>
-        </p:txBody>
-      </p:sp>
-      <p:sp>
-        <p:nvSpPr>
-          <p:cNvPr id="7" name="Date Placeholder 6">
-            <a:extLst>
-              <a:ext uri="{FF2B5EF4-FFF2-40B4-BE49-F238E27FC236}">
-                <a16:creationId xmlns:a16="http://schemas.microsoft.com/office/drawing/2014/main" id="{5440687D-ECAD-B85B-AE66-540582BF35DC}"/>
-              </a:ext>
-            </a:extLst>
-          </p:cNvPr>
+            <a:endParaRPr lang="en-US"/>
+          </a:p>
+        </p:txBody>
+      </p:sp>
+      <p:sp>
+        <p:nvSpPr>
+          <p:cNvPr id="7" name="Date Placeholder 6"/>
           <p:cNvSpPr>
             <a:spLocks noGrp="1"/>
           </p:cNvSpPr>
@@ -1822,7 +1609,6 @@
           <a:p>
             <a:fld id="{E58F602B-0AE4-435B-8479-9B7FB981A42B}" type="datetimeFigureOut">
               <a:rPr lang="en-US" smtClean="0"/>
-              <a:t>6/17/2025</a:t>
             </a:fld>
             <a:endParaRPr lang="en-US"/>
           </a:p>
@@ -1830,13 +1616,7 @@
       </p:sp>
       <p:sp>
         <p:nvSpPr>
-          <p:cNvPr id="8" name="Footer Placeholder 7">
-            <a:extLst>
-              <a:ext uri="{FF2B5EF4-FFF2-40B4-BE49-F238E27FC236}">
-                <a16:creationId xmlns:a16="http://schemas.microsoft.com/office/drawing/2014/main" id="{32C7E5CD-7AD1-1B68-0CD6-7AD440BEA415}"/>
-              </a:ext>
-            </a:extLst>
-          </p:cNvPr>
+          <p:cNvPr id="8" name="Footer Placeholder 7"/>
           <p:cNvSpPr>
             <a:spLocks noGrp="1"/>
           </p:cNvSpPr>
@@ -1855,13 +1635,7 @@
       </p:sp>
       <p:sp>
         <p:nvSpPr>
-          <p:cNvPr id="9" name="Slide Number Placeholder 8">
-            <a:extLst>
-              <a:ext uri="{FF2B5EF4-FFF2-40B4-BE49-F238E27FC236}">
-                <a16:creationId xmlns:a16="http://schemas.microsoft.com/office/drawing/2014/main" id="{71A75997-621C-3280-9583-12D57EEE8595}"/>
-              </a:ext>
-            </a:extLst>
-          </p:cNvPr>
+          <p:cNvPr id="9" name="Slide Number Placeholder 8"/>
           <p:cNvSpPr>
             <a:spLocks noGrp="1"/>
           </p:cNvSpPr>
@@ -1876,18 +1650,12 @@
           <a:p>
             <a:fld id="{22AEA1C5-4D84-4BB7-AD3B-90B0263C00E4}" type="slidenum">
               <a:rPr lang="en-US" smtClean="0"/>
-              <a:t>‹#›</a:t>
             </a:fld>
             <a:endParaRPr lang="en-US"/>
           </a:p>
         </p:txBody>
       </p:sp>
     </p:spTree>
-    <p:extLst>
-      <p:ext uri="{BB962C8B-B14F-4D97-AF65-F5344CB8AC3E}">
-        <p14:creationId xmlns:p14="http://schemas.microsoft.com/office/powerpoint/2010/main" val="948658743"/>
-      </p:ext>
-    </p:extLst>
   </p:cSld>
   <p:clrMapOvr>
     <a:masterClrMapping/>
@@ -1914,13 +1682,7 @@
       </p:grpSpPr>
       <p:sp>
         <p:nvSpPr>
-          <p:cNvPr id="2" name="Title 1">
-            <a:extLst>
-              <a:ext uri="{FF2B5EF4-FFF2-40B4-BE49-F238E27FC236}">
-                <a16:creationId xmlns:a16="http://schemas.microsoft.com/office/drawing/2014/main" id="{4B968E49-89A7-6352-4729-EFD5AC95486B}"/>
-              </a:ext>
-            </a:extLst>
-          </p:cNvPr>
+          <p:cNvPr id="2" name="Title 1"/>
           <p:cNvSpPr>
             <a:spLocks noGrp="1"/>
           </p:cNvSpPr>
@@ -1937,18 +1699,13 @@
               <a:rPr lang="en-US"/>
               <a:t>Click to edit Master title style</a:t>
             </a:r>
-          </a:p>
-        </p:txBody>
-      </p:sp>
-      <p:sp>
-        <p:nvSpPr>
-          <p:cNvPr id="3" name="Date Placeholder 2">
-            <a:extLst>
-              <a:ext uri="{FF2B5EF4-FFF2-40B4-BE49-F238E27FC236}">
-                <a16:creationId xmlns:a16="http://schemas.microsoft.com/office/drawing/2014/main" id="{00D404CA-EB9A-A1B4-7DAA-4A5E1D916729}"/>
-              </a:ext>
-            </a:extLst>
-          </p:cNvPr>
+            <a:endParaRPr lang="en-US"/>
+          </a:p>
+        </p:txBody>
+      </p:sp>
+      <p:sp>
+        <p:nvSpPr>
+          <p:cNvPr id="3" name="Date Placeholder 2"/>
           <p:cNvSpPr>
             <a:spLocks noGrp="1"/>
           </p:cNvSpPr>
@@ -1963,7 +1720,6 @@
           <a:p>
             <a:fld id="{E58F602B-0AE4-435B-8479-9B7FB981A42B}" type="datetimeFigureOut">
               <a:rPr lang="en-US" smtClean="0"/>
-              <a:t>6/17/2025</a:t>
             </a:fld>
             <a:endParaRPr lang="en-US"/>
           </a:p>
@@ -1971,13 +1727,7 @@
       </p:sp>
       <p:sp>
         <p:nvSpPr>
-          <p:cNvPr id="4" name="Footer Placeholder 3">
-            <a:extLst>
-              <a:ext uri="{FF2B5EF4-FFF2-40B4-BE49-F238E27FC236}">
-                <a16:creationId xmlns:a16="http://schemas.microsoft.com/office/drawing/2014/main" id="{FA66A470-699B-A94B-156A-E4CFC208190F}"/>
-              </a:ext>
-            </a:extLst>
-          </p:cNvPr>
+          <p:cNvPr id="4" name="Footer Placeholder 3"/>
           <p:cNvSpPr>
             <a:spLocks noGrp="1"/>
           </p:cNvSpPr>
@@ -1996,13 +1746,7 @@
       </p:sp>
       <p:sp>
         <p:nvSpPr>
-          <p:cNvPr id="5" name="Slide Number Placeholder 4">
-            <a:extLst>
-              <a:ext uri="{FF2B5EF4-FFF2-40B4-BE49-F238E27FC236}">
-                <a16:creationId xmlns:a16="http://schemas.microsoft.com/office/drawing/2014/main" id="{720D8B35-CF0E-DD67-4460-81C021850D5C}"/>
-              </a:ext>
-            </a:extLst>
-          </p:cNvPr>
+          <p:cNvPr id="5" name="Slide Number Placeholder 4"/>
           <p:cNvSpPr>
             <a:spLocks noGrp="1"/>
           </p:cNvSpPr>
@@ -2017,18 +1761,12 @@
           <a:p>
             <a:fld id="{22AEA1C5-4D84-4BB7-AD3B-90B0263C00E4}" type="slidenum">
               <a:rPr lang="en-US" smtClean="0"/>
-              <a:t>‹#›</a:t>
             </a:fld>
             <a:endParaRPr lang="en-US"/>
           </a:p>
         </p:txBody>
       </p:sp>
     </p:spTree>
-    <p:extLst>
-      <p:ext uri="{BB962C8B-B14F-4D97-AF65-F5344CB8AC3E}">
-        <p14:creationId xmlns:p14="http://schemas.microsoft.com/office/powerpoint/2010/main" val="107767569"/>
-      </p:ext>
-    </p:extLst>
   </p:cSld>
   <p:clrMapOvr>
     <a:masterClrMapping/>
@@ -2055,13 +1793,7 @@
       </p:grpSpPr>
       <p:sp>
         <p:nvSpPr>
-          <p:cNvPr id="2" name="Date Placeholder 1">
-            <a:extLst>
-              <a:ext uri="{FF2B5EF4-FFF2-40B4-BE49-F238E27FC236}">
-                <a16:creationId xmlns:a16="http://schemas.microsoft.com/office/drawing/2014/main" id="{5CA7F210-0E79-15C9-F517-A6793515E366}"/>
-              </a:ext>
-            </a:extLst>
-          </p:cNvPr>
+          <p:cNvPr id="2" name="Date Placeholder 1"/>
           <p:cNvSpPr>
             <a:spLocks noGrp="1"/>
           </p:cNvSpPr>
@@ -2076,7 +1808,6 @@
           <a:p>
             <a:fld id="{E58F602B-0AE4-435B-8479-9B7FB981A42B}" type="datetimeFigureOut">
               <a:rPr lang="en-US" smtClean="0"/>
-              <a:t>6/17/2025</a:t>
             </a:fld>
             <a:endParaRPr lang="en-US"/>
           </a:p>
@@ -2084,13 +1815,7 @@
       </p:sp>
       <p:sp>
         <p:nvSpPr>
-          <p:cNvPr id="3" name="Footer Placeholder 2">
-            <a:extLst>
-              <a:ext uri="{FF2B5EF4-FFF2-40B4-BE49-F238E27FC236}">
-                <a16:creationId xmlns:a16="http://schemas.microsoft.com/office/drawing/2014/main" id="{8339E472-E31A-495E-4194-C640E8157ADD}"/>
-              </a:ext>
-            </a:extLst>
-          </p:cNvPr>
+          <p:cNvPr id="3" name="Footer Placeholder 2"/>
           <p:cNvSpPr>
             <a:spLocks noGrp="1"/>
           </p:cNvSpPr>
@@ -2109,13 +1834,7 @@
       </p:sp>
       <p:sp>
         <p:nvSpPr>
-          <p:cNvPr id="4" name="Slide Number Placeholder 3">
-            <a:extLst>
-              <a:ext uri="{FF2B5EF4-FFF2-40B4-BE49-F238E27FC236}">
-                <a16:creationId xmlns:a16="http://schemas.microsoft.com/office/drawing/2014/main" id="{ACFDCE79-FFA9-F88F-B498-5B8521A6C7A1}"/>
-              </a:ext>
-            </a:extLst>
-          </p:cNvPr>
+          <p:cNvPr id="4" name="Slide Number Placeholder 3"/>
           <p:cNvSpPr>
             <a:spLocks noGrp="1"/>
           </p:cNvSpPr>
@@ -2130,18 +1849,12 @@
           <a:p>
             <a:fld id="{22AEA1C5-4D84-4BB7-AD3B-90B0263C00E4}" type="slidenum">
               <a:rPr lang="en-US" smtClean="0"/>
-              <a:t>‹#›</a:t>
             </a:fld>
             <a:endParaRPr lang="en-US"/>
           </a:p>
         </p:txBody>
       </p:sp>
     </p:spTree>
-    <p:extLst>
-      <p:ext uri="{BB962C8B-B14F-4D97-AF65-F5344CB8AC3E}">
-        <p14:creationId xmlns:p14="http://schemas.microsoft.com/office/powerpoint/2010/main" val="3213438934"/>
-      </p:ext>
-    </p:extLst>
   </p:cSld>
   <p:clrMapOvr>
     <a:masterClrMapping/>
@@ -2168,13 +1881,7 @@
       </p:grpSpPr>
       <p:sp>
         <p:nvSpPr>
-          <p:cNvPr id="2" name="Title 1">
-            <a:extLst>
-              <a:ext uri="{FF2B5EF4-FFF2-40B4-BE49-F238E27FC236}">
-                <a16:creationId xmlns:a16="http://schemas.microsoft.com/office/drawing/2014/main" id="{CD098433-50D2-116D-2947-F1807175F47E}"/>
-              </a:ext>
-            </a:extLst>
-          </p:cNvPr>
+          <p:cNvPr id="2" name="Title 1"/>
           <p:cNvSpPr>
             <a:spLocks noGrp="1"/>
           </p:cNvSpPr>
@@ -2200,18 +1907,13 @@
               <a:rPr lang="en-US"/>
               <a:t>Click to edit Master title style</a:t>
             </a:r>
-          </a:p>
-        </p:txBody>
-      </p:sp>
-      <p:sp>
-        <p:nvSpPr>
-          <p:cNvPr id="3" name="Content Placeholder 2">
-            <a:extLst>
-              <a:ext uri="{FF2B5EF4-FFF2-40B4-BE49-F238E27FC236}">
-                <a16:creationId xmlns:a16="http://schemas.microsoft.com/office/drawing/2014/main" id="{50735C52-C0F0-8242-6E9C-9ABCB0621956}"/>
-              </a:ext>
-            </a:extLst>
-          </p:cNvPr>
+            <a:endParaRPr lang="en-US"/>
+          </a:p>
+        </p:txBody>
+      </p:sp>
+      <p:sp>
+        <p:nvSpPr>
+          <p:cNvPr id="3" name="Content Placeholder 2"/>
           <p:cNvSpPr>
             <a:spLocks noGrp="1"/>
           </p:cNvSpPr>
@@ -2262,6 +1964,7 @@
               <a:rPr lang="en-US"/>
               <a:t>Click to edit Master text styles</a:t>
             </a:r>
+            <a:endParaRPr lang="en-US"/>
           </a:p>
           <a:p>
             <a:pPr lvl="1"/>
@@ -2269,6 +1972,7 @@
               <a:rPr lang="en-US"/>
               <a:t>Second level</a:t>
             </a:r>
+            <a:endParaRPr lang="en-US"/>
           </a:p>
           <a:p>
             <a:pPr lvl="2"/>
@@ -2276,6 +1980,7 @@
               <a:rPr lang="en-US"/>
               <a:t>Third level</a:t>
             </a:r>
+            <a:endParaRPr lang="en-US"/>
           </a:p>
           <a:p>
             <a:pPr lvl="3"/>
@@ -2283,6 +1988,7 @@
               <a:rPr lang="en-US"/>
               <a:t>Fourth level</a:t>
             </a:r>
+            <a:endParaRPr lang="en-US"/>
           </a:p>
           <a:p>
             <a:pPr lvl="4"/>
@@ -2290,18 +1996,13 @@
               <a:rPr lang="en-US"/>
               <a:t>Fifth level</a:t>
             </a:r>
-          </a:p>
-        </p:txBody>
-      </p:sp>
-      <p:sp>
-        <p:nvSpPr>
-          <p:cNvPr id="4" name="Text Placeholder 3">
-            <a:extLst>
-              <a:ext uri="{FF2B5EF4-FFF2-40B4-BE49-F238E27FC236}">
-                <a16:creationId xmlns:a16="http://schemas.microsoft.com/office/drawing/2014/main" id="{DB4E7BAE-79E1-1289-B209-D28EB59B1D6E}"/>
-              </a:ext>
-            </a:extLst>
-          </p:cNvPr>
+            <a:endParaRPr lang="en-US"/>
+          </a:p>
+        </p:txBody>
+      </p:sp>
+      <p:sp>
+        <p:nvSpPr>
+          <p:cNvPr id="4" name="Text Placeholder 3"/>
           <p:cNvSpPr>
             <a:spLocks noGrp="1"/>
           </p:cNvSpPr>
@@ -2361,18 +2062,13 @@
               <a:rPr lang="en-US"/>
               <a:t>Click to edit Master text styles</a:t>
             </a:r>
-          </a:p>
-        </p:txBody>
-      </p:sp>
-      <p:sp>
-        <p:nvSpPr>
-          <p:cNvPr id="5" name="Date Placeholder 4">
-            <a:extLst>
-              <a:ext uri="{FF2B5EF4-FFF2-40B4-BE49-F238E27FC236}">
-                <a16:creationId xmlns:a16="http://schemas.microsoft.com/office/drawing/2014/main" id="{9983A444-0846-B044-B9A6-78EFD69EB1DF}"/>
-              </a:ext>
-            </a:extLst>
-          </p:cNvPr>
+            <a:endParaRPr lang="en-US"/>
+          </a:p>
+        </p:txBody>
+      </p:sp>
+      <p:sp>
+        <p:nvSpPr>
+          <p:cNvPr id="5" name="Date Placeholder 4"/>
           <p:cNvSpPr>
             <a:spLocks noGrp="1"/>
           </p:cNvSpPr>
@@ -2387,7 +2083,6 @@
           <a:p>
             <a:fld id="{E58F602B-0AE4-435B-8479-9B7FB981A42B}" type="datetimeFigureOut">
               <a:rPr lang="en-US" smtClean="0"/>
-              <a:t>6/17/2025</a:t>
             </a:fld>
             <a:endParaRPr lang="en-US"/>
           </a:p>
@@ -2395,13 +2090,7 @@
       </p:sp>
       <p:sp>
         <p:nvSpPr>
-          <p:cNvPr id="6" name="Footer Placeholder 5">
-            <a:extLst>
-              <a:ext uri="{FF2B5EF4-FFF2-40B4-BE49-F238E27FC236}">
-                <a16:creationId xmlns:a16="http://schemas.microsoft.com/office/drawing/2014/main" id="{40B40212-DFF3-76B8-F32C-DA76D0146A9E}"/>
-              </a:ext>
-            </a:extLst>
-          </p:cNvPr>
+          <p:cNvPr id="6" name="Footer Placeholder 5"/>
           <p:cNvSpPr>
             <a:spLocks noGrp="1"/>
           </p:cNvSpPr>
@@ -2420,13 +2109,7 @@
       </p:sp>
       <p:sp>
         <p:nvSpPr>
-          <p:cNvPr id="7" name="Slide Number Placeholder 6">
-            <a:extLst>
-              <a:ext uri="{FF2B5EF4-FFF2-40B4-BE49-F238E27FC236}">
-                <a16:creationId xmlns:a16="http://schemas.microsoft.com/office/drawing/2014/main" id="{61059BA8-81BD-A27A-A8F6-F10F8C6CB6EC}"/>
-              </a:ext>
-            </a:extLst>
-          </p:cNvPr>
+          <p:cNvPr id="7" name="Slide Number Placeholder 6"/>
           <p:cNvSpPr>
             <a:spLocks noGrp="1"/>
           </p:cNvSpPr>
@@ -2441,18 +2124,12 @@
           <a:p>
             <a:fld id="{22AEA1C5-4D84-4BB7-AD3B-90B0263C00E4}" type="slidenum">
               <a:rPr lang="en-US" smtClean="0"/>
-              <a:t>‹#›</a:t>
             </a:fld>
             <a:endParaRPr lang="en-US"/>
           </a:p>
         </p:txBody>
       </p:sp>
     </p:spTree>
-    <p:extLst>
-      <p:ext uri="{BB962C8B-B14F-4D97-AF65-F5344CB8AC3E}">
-        <p14:creationId xmlns:p14="http://schemas.microsoft.com/office/powerpoint/2010/main" val="1243958181"/>
-      </p:ext>
-    </p:extLst>
   </p:cSld>
   <p:clrMapOvr>
     <a:masterClrMapping/>
@@ -2479,13 +2156,7 @@
       </p:grpSpPr>
       <p:sp>
         <p:nvSpPr>
-          <p:cNvPr id="2" name="Title 1">
-            <a:extLst>
-              <a:ext uri="{FF2B5EF4-FFF2-40B4-BE49-F238E27FC236}">
-                <a16:creationId xmlns:a16="http://schemas.microsoft.com/office/drawing/2014/main" id="{68996D5A-9F79-E8CE-9E55-947D326CFB54}"/>
-              </a:ext>
-            </a:extLst>
-          </p:cNvPr>
+          <p:cNvPr id="2" name="Title 1"/>
           <p:cNvSpPr>
             <a:spLocks noGrp="1"/>
           </p:cNvSpPr>
@@ -2511,18 +2182,13 @@
               <a:rPr lang="en-US"/>
               <a:t>Click to edit Master title style</a:t>
             </a:r>
-          </a:p>
-        </p:txBody>
-      </p:sp>
-      <p:sp>
-        <p:nvSpPr>
-          <p:cNvPr id="3" name="Picture Placeholder 2">
-            <a:extLst>
-              <a:ext uri="{FF2B5EF4-FFF2-40B4-BE49-F238E27FC236}">
-                <a16:creationId xmlns:a16="http://schemas.microsoft.com/office/drawing/2014/main" id="{DD18BE6E-5590-1ACB-4790-448D1138825C}"/>
-              </a:ext>
-            </a:extLst>
-          </p:cNvPr>
+            <a:endParaRPr lang="en-US"/>
+          </a:p>
+        </p:txBody>
+      </p:sp>
+      <p:sp>
+        <p:nvSpPr>
+          <p:cNvPr id="3" name="Picture Placeholder 2"/>
           <p:cNvSpPr>
             <a:spLocks noGrp="1"/>
           </p:cNvSpPr>
@@ -2583,13 +2249,7 @@
       </p:sp>
       <p:sp>
         <p:nvSpPr>
-          <p:cNvPr id="4" name="Text Placeholder 3">
-            <a:extLst>
-              <a:ext uri="{FF2B5EF4-FFF2-40B4-BE49-F238E27FC236}">
-                <a16:creationId xmlns:a16="http://schemas.microsoft.com/office/drawing/2014/main" id="{924F6AE9-8DBD-A7B9-77E5-8F2D5FA33A04}"/>
-              </a:ext>
-            </a:extLst>
-          </p:cNvPr>
+          <p:cNvPr id="4" name="Text Placeholder 3"/>
           <p:cNvSpPr>
             <a:spLocks noGrp="1"/>
           </p:cNvSpPr>
@@ -2649,18 +2309,13 @@
               <a:rPr lang="en-US"/>
               <a:t>Click to edit Master text styles</a:t>
             </a:r>
-          </a:p>
-        </p:txBody>
-      </p:sp>
-      <p:sp>
-        <p:nvSpPr>
-          <p:cNvPr id="5" name="Date Placeholder 4">
-            <a:extLst>
-              <a:ext uri="{FF2B5EF4-FFF2-40B4-BE49-F238E27FC236}">
-                <a16:creationId xmlns:a16="http://schemas.microsoft.com/office/drawing/2014/main" id="{E3DE3311-8768-AC53-CF25-E22EFEE8F413}"/>
-              </a:ext>
-            </a:extLst>
-          </p:cNvPr>
+            <a:endParaRPr lang="en-US"/>
+          </a:p>
+        </p:txBody>
+      </p:sp>
+      <p:sp>
+        <p:nvSpPr>
+          <p:cNvPr id="5" name="Date Placeholder 4"/>
           <p:cNvSpPr>
             <a:spLocks noGrp="1"/>
           </p:cNvSpPr>
@@ -2675,7 +2330,6 @@
           <a:p>
             <a:fld id="{E58F602B-0AE4-435B-8479-9B7FB981A42B}" type="datetimeFigureOut">
               <a:rPr lang="en-US" smtClean="0"/>
-              <a:t>6/17/2025</a:t>
             </a:fld>
             <a:endParaRPr lang="en-US"/>
           </a:p>
@@ -2683,13 +2337,7 @@
       </p:sp>
       <p:sp>
         <p:nvSpPr>
-          <p:cNvPr id="6" name="Footer Placeholder 5">
-            <a:extLst>
-              <a:ext uri="{FF2B5EF4-FFF2-40B4-BE49-F238E27FC236}">
-                <a16:creationId xmlns:a16="http://schemas.microsoft.com/office/drawing/2014/main" id="{A72A9869-9E64-314A-F343-E0BDED04A405}"/>
-              </a:ext>
-            </a:extLst>
-          </p:cNvPr>
+          <p:cNvPr id="6" name="Footer Placeholder 5"/>
           <p:cNvSpPr>
             <a:spLocks noGrp="1"/>
           </p:cNvSpPr>
@@ -2708,13 +2356,7 @@
       </p:sp>
       <p:sp>
         <p:nvSpPr>
-          <p:cNvPr id="7" name="Slide Number Placeholder 6">
-            <a:extLst>
-              <a:ext uri="{FF2B5EF4-FFF2-40B4-BE49-F238E27FC236}">
-                <a16:creationId xmlns:a16="http://schemas.microsoft.com/office/drawing/2014/main" id="{F8892ADE-9985-F3C3-FFE5-956C5E569BA4}"/>
-              </a:ext>
-            </a:extLst>
-          </p:cNvPr>
+          <p:cNvPr id="7" name="Slide Number Placeholder 6"/>
           <p:cNvSpPr>
             <a:spLocks noGrp="1"/>
           </p:cNvSpPr>
@@ -2729,18 +2371,12 @@
           <a:p>
             <a:fld id="{22AEA1C5-4D84-4BB7-AD3B-90B0263C00E4}" type="slidenum">
               <a:rPr lang="en-US" smtClean="0"/>
-              <a:t>‹#›</a:t>
             </a:fld>
             <a:endParaRPr lang="en-US"/>
           </a:p>
         </p:txBody>
       </p:sp>
     </p:spTree>
-    <p:extLst>
-      <p:ext uri="{BB962C8B-B14F-4D97-AF65-F5344CB8AC3E}">
-        <p14:creationId xmlns:p14="http://schemas.microsoft.com/office/powerpoint/2010/main" val="1617762030"/>
-      </p:ext>
-    </p:extLst>
   </p:cSld>
   <p:clrMapOvr>
     <a:masterClrMapping/>
@@ -2772,13 +2408,7 @@
       </p:grpSpPr>
       <p:sp>
         <p:nvSpPr>
-          <p:cNvPr id="2" name="Title Placeholder 1">
-            <a:extLst>
-              <a:ext uri="{FF2B5EF4-FFF2-40B4-BE49-F238E27FC236}">
-                <a16:creationId xmlns:a16="http://schemas.microsoft.com/office/drawing/2014/main" id="{6046F899-E49D-FC5C-AAE7-7057793EEFA8}"/>
-              </a:ext>
-            </a:extLst>
-          </p:cNvPr>
+          <p:cNvPr id="2" name="Title Placeholder 1"/>
           <p:cNvSpPr>
             <a:spLocks noGrp="1"/>
           </p:cNvSpPr>
@@ -2805,18 +2435,13 @@
               <a:rPr lang="en-US"/>
               <a:t>Click to edit Master title style</a:t>
             </a:r>
-          </a:p>
-        </p:txBody>
-      </p:sp>
-      <p:sp>
-        <p:nvSpPr>
-          <p:cNvPr id="3" name="Text Placeholder 2">
-            <a:extLst>
-              <a:ext uri="{FF2B5EF4-FFF2-40B4-BE49-F238E27FC236}">
-                <a16:creationId xmlns:a16="http://schemas.microsoft.com/office/drawing/2014/main" id="{98735CA6-F9C8-957F-7F32-29E30AB6ABDB}"/>
-              </a:ext>
-            </a:extLst>
-          </p:cNvPr>
+            <a:endParaRPr lang="en-US"/>
+          </a:p>
+        </p:txBody>
+      </p:sp>
+      <p:sp>
+        <p:nvSpPr>
+          <p:cNvPr id="3" name="Text Placeholder 2"/>
           <p:cNvSpPr>
             <a:spLocks noGrp="1"/>
           </p:cNvSpPr>
@@ -2844,6 +2469,7 @@
               <a:rPr lang="en-US"/>
               <a:t>Click to edit Master text styles</a:t>
             </a:r>
+            <a:endParaRPr lang="en-US"/>
           </a:p>
           <a:p>
             <a:pPr lvl="1"/>
@@ -2851,6 +2477,7 @@
               <a:rPr lang="en-US"/>
               <a:t>Second level</a:t>
             </a:r>
+            <a:endParaRPr lang="en-US"/>
           </a:p>
           <a:p>
             <a:pPr lvl="2"/>
@@ -2858,6 +2485,7 @@
               <a:rPr lang="en-US"/>
               <a:t>Third level</a:t>
             </a:r>
+            <a:endParaRPr lang="en-US"/>
           </a:p>
           <a:p>
             <a:pPr lvl="3"/>
@@ -2865,6 +2493,7 @@
               <a:rPr lang="en-US"/>
               <a:t>Fourth level</a:t>
             </a:r>
+            <a:endParaRPr lang="en-US"/>
           </a:p>
           <a:p>
             <a:pPr lvl="4"/>
@@ -2872,18 +2501,13 @@
               <a:rPr lang="en-US"/>
               <a:t>Fifth level</a:t>
             </a:r>
-          </a:p>
-        </p:txBody>
-      </p:sp>
-      <p:sp>
-        <p:nvSpPr>
-          <p:cNvPr id="4" name="Date Placeholder 3">
-            <a:extLst>
-              <a:ext uri="{FF2B5EF4-FFF2-40B4-BE49-F238E27FC236}">
-                <a16:creationId xmlns:a16="http://schemas.microsoft.com/office/drawing/2014/main" id="{450374A0-94B2-8284-6DBD-F9B97FCA8DE1}"/>
-              </a:ext>
-            </a:extLst>
-          </p:cNvPr>
+            <a:endParaRPr lang="en-US"/>
+          </a:p>
+        </p:txBody>
+      </p:sp>
+      <p:sp>
+        <p:nvSpPr>
+          <p:cNvPr id="4" name="Date Placeholder 3"/>
           <p:cNvSpPr>
             <a:spLocks noGrp="1"/>
           </p:cNvSpPr>
@@ -2916,7 +2540,6 @@
           <a:p>
             <a:fld id="{E58F602B-0AE4-435B-8479-9B7FB981A42B}" type="datetimeFigureOut">
               <a:rPr lang="en-US" smtClean="0"/>
-              <a:t>6/17/2025</a:t>
             </a:fld>
             <a:endParaRPr lang="en-US"/>
           </a:p>
@@ -2924,13 +2547,7 @@
       </p:sp>
       <p:sp>
         <p:nvSpPr>
-          <p:cNvPr id="5" name="Footer Placeholder 4">
-            <a:extLst>
-              <a:ext uri="{FF2B5EF4-FFF2-40B4-BE49-F238E27FC236}">
-                <a16:creationId xmlns:a16="http://schemas.microsoft.com/office/drawing/2014/main" id="{B3F19AED-1F4E-8BD2-02B8-774F92773D52}"/>
-              </a:ext>
-            </a:extLst>
-          </p:cNvPr>
+          <p:cNvPr id="5" name="Footer Placeholder 4"/>
           <p:cNvSpPr>
             <a:spLocks noGrp="1"/>
           </p:cNvSpPr>
@@ -2967,13 +2584,7 @@
       </p:sp>
       <p:sp>
         <p:nvSpPr>
-          <p:cNvPr id="6" name="Slide Number Placeholder 5">
-            <a:extLst>
-              <a:ext uri="{FF2B5EF4-FFF2-40B4-BE49-F238E27FC236}">
-                <a16:creationId xmlns:a16="http://schemas.microsoft.com/office/drawing/2014/main" id="{01E28282-6386-3D80-6069-F4ED80DAE8AC}"/>
-              </a:ext>
-            </a:extLst>
-          </p:cNvPr>
+          <p:cNvPr id="6" name="Slide Number Placeholder 5"/>
           <p:cNvSpPr>
             <a:spLocks noGrp="1"/>
           </p:cNvSpPr>
@@ -3006,18 +2617,12 @@
           <a:p>
             <a:fld id="{22AEA1C5-4D84-4BB7-AD3B-90B0263C00E4}" type="slidenum">
               <a:rPr lang="en-US" smtClean="0"/>
-              <a:t>‹#›</a:t>
             </a:fld>
             <a:endParaRPr lang="en-US"/>
           </a:p>
         </p:txBody>
       </p:sp>
     </p:spTree>
-    <p:extLst>
-      <p:ext uri="{BB962C8B-B14F-4D97-AF65-F5344CB8AC3E}">
-        <p14:creationId xmlns:p14="http://schemas.microsoft.com/office/powerpoint/2010/main" val="2192360299"/>
-      </p:ext>
-    </p:extLst>
   </p:cSld>
   <p:clrMap bg1="lt1" tx1="dk1" bg2="lt2" tx2="dk2" accent1="accent1" accent2="accent2" accent3="accent3" accent4="accent4" accent5="accent5" accent6="accent6" hlink="hlink" folHlink="folHlink"/>
   <p:sldLayoutIdLst>
@@ -3343,13 +2948,7 @@
       </p:grpSpPr>
       <p:sp>
         <p:nvSpPr>
-          <p:cNvPr id="2" name="Title 1">
-            <a:extLst>
-              <a:ext uri="{FF2B5EF4-FFF2-40B4-BE49-F238E27FC236}">
-                <a16:creationId xmlns:a16="http://schemas.microsoft.com/office/drawing/2014/main" id="{30F73FEC-DF1A-E6BB-B793-515C7169ED7D}"/>
-              </a:ext>
-            </a:extLst>
-          </p:cNvPr>
+          <p:cNvPr id="2" name="Title 1"/>
           <p:cNvSpPr>
             <a:spLocks noGrp="1"/>
           </p:cNvSpPr>
@@ -3359,7 +2958,7 @@
         </p:nvSpPr>
         <p:spPr>
           <a:xfrm>
-            <a:off x="2815988" y="0"/>
+            <a:off x="2815988" y="107315"/>
             <a:ext cx="6560024" cy="521594"/>
           </a:xfrm>
         </p:spPr>
@@ -3382,18 +2981,22 @@
               </a:rPr>
               <a:t>Mythical Creature Catalog</a:t>
             </a:r>
-          </a:p>
-        </p:txBody>
-      </p:sp>
-      <p:sp>
-        <p:nvSpPr>
-          <p:cNvPr id="3" name="Subtitle 2">
-            <a:extLst>
-              <a:ext uri="{FF2B5EF4-FFF2-40B4-BE49-F238E27FC236}">
-                <a16:creationId xmlns:a16="http://schemas.microsoft.com/office/drawing/2014/main" id="{068B437A-0E28-BE79-E0A0-27D4C3BB119B}"/>
-              </a:ext>
-            </a:extLst>
-          </p:cNvPr>
+            <a:endParaRPr lang="en-US" sz="4000" dirty="0">
+              <a:solidFill>
+                <a:schemeClr val="bg1">
+                  <a:lumMod val="95000"/>
+                </a:schemeClr>
+              </a:solidFill>
+              <a:latin typeface="Gabriola" panose="04040605051002020D02" pitchFamily="82" charset="0"/>
+              <a:ea typeface="ADLaM Display" panose="020F0502020204030204" pitchFamily="2" charset="0"/>
+              <a:cs typeface="ADLaM Display" panose="020F0502020204030204" pitchFamily="2" charset="0"/>
+            </a:endParaRPr>
+          </a:p>
+        </p:txBody>
+      </p:sp>
+      <p:sp>
+        <p:nvSpPr>
+          <p:cNvPr id="3" name="Subtitle 2"/>
           <p:cNvSpPr>
             <a:spLocks noGrp="1"/>
           </p:cNvSpPr>
@@ -3403,8 +3006,8 @@
         </p:nvSpPr>
         <p:spPr>
           <a:xfrm>
-            <a:off x="4717576" y="521595"/>
-            <a:ext cx="2756848" cy="521594"/>
+            <a:off x="4244340" y="805180"/>
+            <a:ext cx="3703320" cy="755650"/>
           </a:xfrm>
         </p:spPr>
         <p:txBody>
@@ -3424,6 +3027,16 @@
               </a:rPr>
               <a:t>Team Members: </a:t>
             </a:r>
+            <a:endParaRPr lang="en-US" sz="1200" dirty="0">
+              <a:solidFill>
+                <a:schemeClr val="bg1">
+                  <a:lumMod val="95000"/>
+                </a:schemeClr>
+              </a:solidFill>
+              <a:latin typeface="Javanese Text" panose="02000000000000000000" pitchFamily="2" charset="0"/>
+            </a:endParaRPr>
+          </a:p>
+          <a:p>
             <a:r>
               <a:rPr lang="en-US" sz="1200" dirty="0" err="1">
                 <a:solidFill>
@@ -3446,29 +3059,31 @@
               </a:rPr>
               <a:t> Jin, Leyan Pan, Zachary Rudin, Ye Zhang</a:t>
             </a:r>
+            <a:endParaRPr lang="en-US" sz="1200" dirty="0">
+              <a:solidFill>
+                <a:schemeClr val="bg1">
+                  <a:lumMod val="95000"/>
+                </a:schemeClr>
+              </a:solidFill>
+              <a:latin typeface="Javanese Text" panose="02000000000000000000" pitchFamily="2" charset="0"/>
+            </a:endParaRPr>
           </a:p>
         </p:txBody>
       </p:sp>
       <p:pic>
         <p:nvPicPr>
-          <p:cNvPr id="6" name="Picture 5" descr="A dragon with wings and tail">
-            <a:extLst>
-              <a:ext uri="{FF2B5EF4-FFF2-40B4-BE49-F238E27FC236}">
-                <a16:creationId xmlns:a16="http://schemas.microsoft.com/office/drawing/2014/main" id="{CD275FE4-4BE1-44D7-8146-8F904575988A}"/>
-              </a:ext>
-            </a:extLst>
-          </p:cNvPr>
+          <p:cNvPr id="6" name="Picture 5" descr="A dragon with wings and tail"/>
           <p:cNvPicPr>
             <a:picLocks noChangeAspect="1"/>
           </p:cNvPicPr>
           <p:nvPr/>
         </p:nvPicPr>
         <p:blipFill>
-          <a:blip r:embed="rId2">
+          <a:blip r:embed="rId1">
             <a:extLst>
               <a:ext uri="{BEBA8EAE-BF5A-486C-A8C5-ECC9F3942E4B}">
                 <a14:imgProps xmlns:a14="http://schemas.microsoft.com/office/drawing/2010/main">
-                  <a14:imgLayer r:embed="rId3">
+                  <a14:imgLayer r:embed="rId2">
                     <a14:imgEffect>
                       <a14:brightnessContrast bright="-20000" contrast="-40000"/>
                     </a14:imgEffect>
@@ -3486,7 +3101,7 @@
         </p:blipFill>
         <p:spPr>
           <a:xfrm>
-            <a:off x="3213279" y="2008079"/>
+            <a:off x="2201089" y="1385144"/>
             <a:ext cx="3912165" cy="1902690"/>
           </a:xfrm>
           <a:prstGeom prst="rect">
@@ -3496,19 +3111,13 @@
       </p:pic>
       <p:sp>
         <p:nvSpPr>
-          <p:cNvPr id="7" name="TextBox 6">
-            <a:extLst>
-              <a:ext uri="{FF2B5EF4-FFF2-40B4-BE49-F238E27FC236}">
-                <a16:creationId xmlns:a16="http://schemas.microsoft.com/office/drawing/2014/main" id="{0649F9E1-C4BE-748C-E04D-7EF0FD30CC93}"/>
-              </a:ext>
-            </a:extLst>
-          </p:cNvPr>
+          <p:cNvPr id="7" name="TextBox 6"/>
           <p:cNvSpPr txBox="1"/>
           <p:nvPr/>
         </p:nvSpPr>
         <p:spPr>
           <a:xfrm>
-            <a:off x="244699" y="444321"/>
+            <a:off x="68169" y="107136"/>
             <a:ext cx="4037526" cy="1477328"/>
           </a:xfrm>
           <a:prstGeom prst="rect">
@@ -3532,6 +3141,13 @@
               </a:rPr>
               <a:t>Application Data: Creature</a:t>
             </a:r>
+            <a:endParaRPr lang="en-US" sz="1000" dirty="0">
+              <a:solidFill>
+                <a:schemeClr val="bg1">
+                  <a:lumMod val="95000"/>
+                </a:schemeClr>
+              </a:solidFill>
+            </a:endParaRPr>
           </a:p>
           <a:p>
             <a:pPr marL="285750" indent="-285750">
@@ -3548,6 +3164,13 @@
               </a:rPr>
               <a:t>Creature ID (String) – Primary Key, abbreviated name – abbreviated creature type, e.g. FNKS-BD</a:t>
             </a:r>
+            <a:endParaRPr lang="en-US" sz="1000" dirty="0">
+              <a:solidFill>
+                <a:schemeClr val="bg1">
+                  <a:lumMod val="95000"/>
+                </a:schemeClr>
+              </a:solidFill>
+            </a:endParaRPr>
           </a:p>
           <a:p>
             <a:pPr marL="285750" indent="-285750">
@@ -3564,6 +3187,13 @@
               </a:rPr>
               <a:t>Name (String) – Full name of creature</a:t>
             </a:r>
+            <a:endParaRPr lang="en-US" sz="1000" dirty="0">
+              <a:solidFill>
+                <a:schemeClr val="bg1">
+                  <a:lumMod val="95000"/>
+                </a:schemeClr>
+              </a:solidFill>
+            </a:endParaRPr>
           </a:p>
           <a:p>
             <a:pPr marL="285750" indent="-285750">
@@ -3580,6 +3210,13 @@
               </a:rPr>
               <a:t>Category (String) – Type of creature, e.g. Bird</a:t>
             </a:r>
+            <a:endParaRPr lang="en-US" sz="1000" dirty="0">
+              <a:solidFill>
+                <a:schemeClr val="bg1">
+                  <a:lumMod val="95000"/>
+                </a:schemeClr>
+              </a:solidFill>
+            </a:endParaRPr>
           </a:p>
           <a:p>
             <a:pPr marL="285750" indent="-285750">
@@ -3596,6 +3233,13 @@
               </a:rPr>
               <a:t>History (String) – Famous Legend/Myth</a:t>
             </a:r>
+            <a:endParaRPr lang="en-US" sz="1000" dirty="0">
+              <a:solidFill>
+                <a:schemeClr val="bg1">
+                  <a:lumMod val="95000"/>
+                </a:schemeClr>
+              </a:solidFill>
+            </a:endParaRPr>
           </a:p>
           <a:p>
             <a:pPr marL="285750" indent="-285750">
@@ -3612,6 +3256,13 @@
               </a:rPr>
               <a:t>Habitat (String) – where the creature lives</a:t>
             </a:r>
+            <a:endParaRPr lang="en-US" sz="1000" dirty="0">
+              <a:solidFill>
+                <a:schemeClr val="bg1">
+                  <a:lumMod val="95000"/>
+                </a:schemeClr>
+              </a:solidFill>
+            </a:endParaRPr>
           </a:p>
           <a:p>
             <a:pPr marL="285750" indent="-285750">
@@ -3628,6 +3279,13 @@
               </a:rPr>
               <a:t>Description (String) – standout characteristics</a:t>
             </a:r>
+            <a:endParaRPr lang="en-US" sz="1000" dirty="0">
+              <a:solidFill>
+                <a:schemeClr val="bg1">
+                  <a:lumMod val="95000"/>
+                </a:schemeClr>
+              </a:solidFill>
+            </a:endParaRPr>
           </a:p>
           <a:p>
             <a:pPr marL="285750" indent="-285750">
@@ -3644,59 +3302,101 @@
               </a:rPr>
               <a:t>Relevant Year (Integer) – year of first  mention/came to relevancy</a:t>
             </a:r>
-          </a:p>
-        </p:txBody>
-      </p:sp>
-      <p:sp>
-        <p:nvSpPr>
-          <p:cNvPr id="8" name="TextBox 7">
-            <a:extLst>
-              <a:ext uri="{FF2B5EF4-FFF2-40B4-BE49-F238E27FC236}">
-                <a16:creationId xmlns:a16="http://schemas.microsoft.com/office/drawing/2014/main" id="{87EE5F4A-B44A-B4F0-9A11-B88C79AF1ADF}"/>
-              </a:ext>
-            </a:extLst>
-          </p:cNvPr>
-          <p:cNvSpPr txBox="1"/>
+            <a:endParaRPr lang="en-US" sz="1000" dirty="0">
+              <a:solidFill>
+                <a:schemeClr val="bg1">
+                  <a:lumMod val="95000"/>
+                </a:schemeClr>
+              </a:solidFill>
+            </a:endParaRPr>
+          </a:p>
+        </p:txBody>
+      </p:sp>
+      <p:grpSp>
+        <p:nvGrpSpPr>
+          <p:cNvPr id="11" name="组合 10"/>
+          <p:cNvGrpSpPr/>
           <p:nvPr/>
-        </p:nvSpPr>
-        <p:spPr>
+        </p:nvGrpSpPr>
+        <p:grpSpPr>
           <a:xfrm>
-            <a:off x="244699" y="1971772"/>
-            <a:ext cx="1648496" cy="307777"/>
+            <a:off x="67945" y="1697355"/>
+            <a:ext cx="2967990" cy="1372235"/>
+            <a:chOff x="385" y="3123"/>
+            <a:chExt cx="4674" cy="2161"/>
           </a:xfrm>
-          <a:prstGeom prst="rect">
-            <a:avLst/>
-          </a:prstGeom>
-          <a:noFill/>
-        </p:spPr>
-        <p:txBody>
-          <a:bodyPr wrap="square" rtlCol="0">
-            <a:spAutoFit/>
-          </a:bodyPr>
-          <a:lstStyle/>
-          <a:p>
-            <a:r>
-              <a:rPr lang="en-US" sz="1400" dirty="0">
+        </p:grpSpPr>
+        <p:sp>
+          <p:nvSpPr>
+            <p:cNvPr id="8" name="TextBox 7"/>
+            <p:cNvSpPr txBox="1"/>
+            <p:nvPr/>
+          </p:nvSpPr>
+          <p:spPr>
+            <a:xfrm>
+              <a:off x="385" y="3123"/>
+              <a:ext cx="2596" cy="485"/>
+            </a:xfrm>
+            <a:prstGeom prst="rect">
+              <a:avLst/>
+            </a:prstGeom>
+            <a:noFill/>
+          </p:spPr>
+          <p:txBody>
+            <a:bodyPr wrap="square" rtlCol="0">
+              <a:spAutoFit/>
+            </a:bodyPr>
+            <a:lstStyle/>
+            <a:p>
+              <a:r>
+                <a:rPr lang="en-US" sz="1400" dirty="0">
+                  <a:solidFill>
+                    <a:schemeClr val="bg1">
+                      <a:lumMod val="95000"/>
+                    </a:schemeClr>
+                  </a:solidFill>
+                </a:rPr>
+                <a:t>Hash function:</a:t>
+              </a:r>
+              <a:endParaRPr lang="en-US" sz="1400" dirty="0">
                 <a:solidFill>
                   <a:schemeClr val="bg1">
                     <a:lumMod val="95000"/>
                   </a:schemeClr>
                 </a:solidFill>
-              </a:rPr>
-              <a:t>Hash function:</a:t>
-            </a:r>
-          </a:p>
-        </p:txBody>
-      </p:sp>
+              </a:endParaRPr>
+            </a:p>
+          </p:txBody>
+        </p:sp>
+        <p:pic>
+          <p:nvPicPr>
+            <p:cNvPr id="10" name="Picture 9" descr="C:/Users/KingS/Desktop/hashFunction - 1.pnghashFunction - 1"/>
+            <p:cNvPicPr>
+              <a:picLocks noChangeAspect="1"/>
+            </p:cNvPicPr>
+            <p:nvPr/>
+          </p:nvPicPr>
+          <p:blipFill>
+            <a:blip r:embed="rId3"/>
+            <a:srcRect t="10" b="10"/>
+            <a:stretch>
+              <a:fillRect/>
+            </a:stretch>
+          </p:blipFill>
+          <p:spPr>
+            <a:xfrm>
+              <a:off x="385" y="3608"/>
+              <a:ext cx="4675" cy="1677"/>
+            </a:xfrm>
+            <a:prstGeom prst="rect">
+              <a:avLst/>
+            </a:prstGeom>
+          </p:spPr>
+        </p:pic>
+      </p:grpSp>
       <p:pic>
         <p:nvPicPr>
-          <p:cNvPr id="10" name="Picture 9">
-            <a:extLst>
-              <a:ext uri="{FF2B5EF4-FFF2-40B4-BE49-F238E27FC236}">
-                <a16:creationId xmlns:a16="http://schemas.microsoft.com/office/drawing/2014/main" id="{7BA49521-2926-1E33-2A05-5C1CB25BDD17}"/>
-              </a:ext>
-            </a:extLst>
-          </p:cNvPr>
+          <p:cNvPr id="27" name="Picture 26"/>
           <p:cNvPicPr>
             <a:picLocks noChangeAspect="1"/>
           </p:cNvPicPr>
@@ -3710,37 +3410,7 @@
         </p:blipFill>
         <p:spPr>
           <a:xfrm>
-            <a:off x="244699" y="2290981"/>
-            <a:ext cx="2968580" cy="1064619"/>
-          </a:xfrm>
-          <a:prstGeom prst="rect">
-            <a:avLst/>
-          </a:prstGeom>
-        </p:spPr>
-      </p:pic>
-      <p:pic>
-        <p:nvPicPr>
-          <p:cNvPr id="27" name="Picture 26">
-            <a:extLst>
-              <a:ext uri="{FF2B5EF4-FFF2-40B4-BE49-F238E27FC236}">
-                <a16:creationId xmlns:a16="http://schemas.microsoft.com/office/drawing/2014/main" id="{FC4DB9E8-DBA3-5E30-9372-530E53428C76}"/>
-              </a:ext>
-            </a:extLst>
-          </p:cNvPr>
-          <p:cNvPicPr>
-            <a:picLocks noChangeAspect="1"/>
-          </p:cNvPicPr>
-          <p:nvPr/>
-        </p:nvPicPr>
-        <p:blipFill>
-          <a:blip r:embed="rId5"/>
-          <a:stretch>
-            <a:fillRect/>
-          </a:stretch>
-        </p:blipFill>
-        <p:spPr>
-          <a:xfrm>
-            <a:off x="8458199" y="521594"/>
+            <a:off x="8458199" y="508259"/>
             <a:ext cx="3733801" cy="6336405"/>
           </a:xfrm>
           <a:prstGeom prst="rect">
@@ -3750,13 +3420,7 @@
       </p:pic>
       <p:sp>
         <p:nvSpPr>
-          <p:cNvPr id="28" name="TextBox 27">
-            <a:extLst>
-              <a:ext uri="{FF2B5EF4-FFF2-40B4-BE49-F238E27FC236}">
-                <a16:creationId xmlns:a16="http://schemas.microsoft.com/office/drawing/2014/main" id="{77901D4E-3D81-D019-9B31-C40941892416}"/>
-              </a:ext>
-            </a:extLst>
-          </p:cNvPr>
+          <p:cNvPr id="28" name="TextBox 27"/>
           <p:cNvSpPr txBox="1"/>
           <p:nvPr/>
         </p:nvSpPr>
@@ -3786,25 +3450,148 @@
               </a:rPr>
               <a:t>Sample Run:</a:t>
             </a:r>
-          </a:p>
-        </p:txBody>
-      </p:sp>
-      <p:sp>
-        <p:nvSpPr>
-          <p:cNvPr id="29" name="TextBox 28">
-            <a:extLst>
-              <a:ext uri="{FF2B5EF4-FFF2-40B4-BE49-F238E27FC236}">
-                <a16:creationId xmlns:a16="http://schemas.microsoft.com/office/drawing/2014/main" id="{F47C449E-C8A2-58AC-DCC9-1B8CA39A4D14}"/>
-              </a:ext>
-            </a:extLst>
-          </p:cNvPr>
+            <a:endParaRPr lang="en-US" dirty="0">
+              <a:solidFill>
+                <a:schemeClr val="bg1">
+                  <a:lumMod val="95000"/>
+                </a:schemeClr>
+              </a:solidFill>
+            </a:endParaRPr>
+          </a:p>
+        </p:txBody>
+      </p:sp>
+      <p:grpSp>
+        <p:nvGrpSpPr>
+          <p:cNvPr id="12" name="组合 11"/>
+          <p:cNvGrpSpPr/>
+          <p:nvPr/>
+        </p:nvGrpSpPr>
+        <p:grpSpPr>
+          <a:xfrm>
+            <a:off x="67945" y="3069590"/>
+            <a:ext cx="5290820" cy="3386455"/>
+            <a:chOff x="107" y="5356"/>
+            <a:chExt cx="8332" cy="5333"/>
+          </a:xfrm>
+        </p:grpSpPr>
+        <p:sp>
+          <p:nvSpPr>
+            <p:cNvPr id="29" name="TextBox 28"/>
+            <p:cNvSpPr txBox="1"/>
+            <p:nvPr/>
+          </p:nvSpPr>
+          <p:spPr>
+            <a:xfrm>
+              <a:off x="107" y="5356"/>
+              <a:ext cx="4049" cy="582"/>
+            </a:xfrm>
+            <a:prstGeom prst="rect">
+              <a:avLst/>
+            </a:prstGeom>
+            <a:noFill/>
+          </p:spPr>
+          <p:txBody>
+            <a:bodyPr wrap="square" rtlCol="0">
+              <a:spAutoFit/>
+            </a:bodyPr>
+            <a:lstStyle/>
+            <a:p>
+              <a:pPr algn="l"/>
+              <a:r>
+                <a:rPr lang="en-US" dirty="0">
+                  <a:solidFill>
+                    <a:schemeClr val="bg1">
+                      <a:lumMod val="95000"/>
+                    </a:schemeClr>
+                  </a:solidFill>
+                </a:rPr>
+                <a:t>Structure Chart</a:t>
+              </a:r>
+              <a:endParaRPr lang="en-US" dirty="0">
+                <a:solidFill>
+                  <a:schemeClr val="bg1">
+                    <a:lumMod val="95000"/>
+                  </a:schemeClr>
+                </a:solidFill>
+              </a:endParaRPr>
+            </a:p>
+          </p:txBody>
+        </p:sp>
+        <p:pic>
+          <p:nvPicPr>
+            <p:cNvPr id="34" name="Picture 33" descr="A black screen with white text&#10;&#10;AI-generated content may be incorrect."/>
+            <p:cNvPicPr>
+              <a:picLocks noChangeAspect="1"/>
+            </p:cNvPicPr>
+            <p:nvPr/>
+          </p:nvPicPr>
+          <p:blipFill>
+            <a:blip r:embed="rId5">
+              <a:extLst>
+                <a:ext uri="{28A0092B-C50C-407E-A947-70E740481C1C}">
+                  <a14:useLocalDpi xmlns:a14="http://schemas.microsoft.com/office/drawing/2010/main" val="0"/>
+                </a:ext>
+              </a:extLst>
+            </a:blip>
+            <a:stretch>
+              <a:fillRect/>
+            </a:stretch>
+          </p:blipFill>
+          <p:spPr>
+            <a:xfrm>
+              <a:off x="107" y="6009"/>
+              <a:ext cx="8332" cy="4681"/>
+            </a:xfrm>
+            <a:prstGeom prst="rect">
+              <a:avLst/>
+            </a:prstGeom>
+            <a:gradFill>
+              <a:gsLst>
+                <a:gs pos="0">
+                  <a:schemeClr val="accent4">
+                    <a:lumMod val="5000"/>
+                    <a:lumOff val="95000"/>
+                  </a:schemeClr>
+                </a:gs>
+                <a:gs pos="70000">
+                  <a:srgbClr val="72BEEB"/>
+                </a:gs>
+                <a:gs pos="41000">
+                  <a:schemeClr val="tx2">
+                    <a:lumMod val="50000"/>
+                    <a:lumOff val="50000"/>
+                  </a:schemeClr>
+                </a:gs>
+                <a:gs pos="83000">
+                  <a:schemeClr val="accent4">
+                    <a:lumMod val="45000"/>
+                    <a:lumOff val="55000"/>
+                  </a:schemeClr>
+                </a:gs>
+                <a:gs pos="100000">
+                  <a:schemeClr val="accent4">
+                    <a:lumMod val="30000"/>
+                    <a:lumOff val="70000"/>
+                  </a:schemeClr>
+                </a:gs>
+              </a:gsLst>
+              <a:path path="circle">
+                <a:fillToRect l="100000" t="100000"/>
+              </a:path>
+            </a:gradFill>
+          </p:spPr>
+        </p:pic>
+      </p:grpSp>
+      <p:sp>
+        <p:nvSpPr>
+          <p:cNvPr id="5" name="文本框 4"/>
           <p:cNvSpPr txBox="1"/>
           <p:nvPr/>
         </p:nvSpPr>
         <p:spPr>
           <a:xfrm>
-            <a:off x="977817" y="3516562"/>
-            <a:ext cx="2571289" cy="369332"/>
+            <a:off x="5545455" y="480060"/>
+            <a:ext cx="1101725" cy="368300"/>
           </a:xfrm>
           <a:prstGeom prst="rect">
             <a:avLst/>
@@ -3815,98 +3602,445 @@
           <a:bodyPr wrap="square" rtlCol="0">
             <a:spAutoFit/>
           </a:bodyPr>
-          <a:lstStyle/>
           <a:p>
             <a:pPr algn="ctr"/>
             <a:r>
-              <a:rPr lang="en-US" dirty="0">
+              <a:rPr lang="en-US" altLang="zh-CN">
                 <a:solidFill>
-                  <a:schemeClr val="bg1">
-                    <a:lumMod val="95000"/>
-                  </a:schemeClr>
+                  <a:schemeClr val="bg1"/>
                 </a:solidFill>
+                <a:latin typeface="Javanese Text" panose="02000000000000000000" pitchFamily="2" charset="0"/>
+                <a:cs typeface="Javanese Text" panose="02000000000000000000" pitchFamily="2" charset="0"/>
               </a:rPr>
-              <a:t>Structure Chart</a:t>
-            </a:r>
-          </a:p>
-        </p:txBody>
-      </p:sp>
-      <p:pic>
-        <p:nvPicPr>
-          <p:cNvPr id="34" name="Picture 33" descr="A black screen with white text&#10;&#10;AI-generated content may be incorrect.">
-            <a:extLst>
-              <a:ext uri="{FF2B5EF4-FFF2-40B4-BE49-F238E27FC236}">
-                <a16:creationId xmlns:a16="http://schemas.microsoft.com/office/drawing/2014/main" id="{657F24C9-10F1-378E-E858-773354A559CF}"/>
-              </a:ext>
-            </a:extLst>
-          </p:cNvPr>
-          <p:cNvPicPr>
-            <a:picLocks noChangeAspect="1"/>
-          </p:cNvPicPr>
+              <a:t>Team #7</a:t>
+            </a:r>
+            <a:endParaRPr lang="en-US" altLang="zh-CN">
+              <a:solidFill>
+                <a:schemeClr val="bg1"/>
+              </a:solidFill>
+              <a:latin typeface="Javanese Text" panose="02000000000000000000" pitchFamily="2" charset="0"/>
+              <a:cs typeface="Javanese Text" panose="02000000000000000000" pitchFamily="2" charset="0"/>
+            </a:endParaRPr>
+          </a:p>
+        </p:txBody>
+      </p:sp>
+      <p:sp>
+        <p:nvSpPr>
+          <p:cNvPr id="9" name="文本框 8"/>
+          <p:cNvSpPr txBox="1"/>
           <p:nvPr/>
-        </p:nvPicPr>
-        <p:blipFill>
-          <a:blip r:embed="rId6">
-            <a:extLst>
-              <a:ext uri="{28A0092B-C50C-407E-A947-70E740481C1C}">
-                <a14:useLocalDpi xmlns:a14="http://schemas.microsoft.com/office/drawing/2010/main" val="0"/>
-              </a:ext>
-            </a:extLst>
-          </a:blip>
-          <a:stretch>
-            <a:fillRect/>
-          </a:stretch>
-        </p:blipFill>
+        </p:nvSpPr>
         <p:spPr>
           <a:xfrm>
-            <a:off x="67757" y="3910769"/>
-            <a:ext cx="5290896" cy="2972573"/>
+            <a:off x="5358765" y="2479675"/>
+            <a:ext cx="3176270" cy="4377690"/>
           </a:xfrm>
           <a:prstGeom prst="rect">
             <a:avLst/>
           </a:prstGeom>
-          <a:gradFill>
-            <a:gsLst>
-              <a:gs pos="0">
-                <a:schemeClr val="accent4">
-                  <a:lumMod val="5000"/>
-                  <a:lumOff val="95000"/>
-                </a:schemeClr>
-              </a:gs>
-              <a:gs pos="70000">
-                <a:srgbClr val="72BEEB"/>
-              </a:gs>
-              <a:gs pos="41000">
-                <a:schemeClr val="tx2">
-                  <a:lumMod val="50000"/>
-                  <a:lumOff val="50000"/>
-                </a:schemeClr>
-              </a:gs>
-              <a:gs pos="83000">
-                <a:schemeClr val="accent4">
-                  <a:lumMod val="45000"/>
-                  <a:lumOff val="55000"/>
-                </a:schemeClr>
-              </a:gs>
-              <a:gs pos="100000">
-                <a:schemeClr val="accent4">
-                  <a:lumMod val="30000"/>
-                  <a:lumOff val="70000"/>
-                </a:schemeClr>
-              </a:gs>
-            </a:gsLst>
-            <a:path path="circle">
-              <a:fillToRect l="100000" t="100000"/>
-            </a:path>
-          </a:gradFill>
+          <a:noFill/>
         </p:spPr>
-      </p:pic>
+        <p:txBody>
+          <a:bodyPr wrap="square" rtlCol="0">
+            <a:noAutofit/>
+          </a:bodyPr>
+          <a:p>
+            <a:pPr indent="0" fontAlgn="auto">
+              <a:lnSpc>
+                <a:spcPts val="1060"/>
+              </a:lnSpc>
+            </a:pPr>
+            <a:r>
+              <a:rPr lang="en-US" altLang="zh-CN" sz="1000" b="1">
+                <a:solidFill>
+                  <a:schemeClr val="bg1"/>
+                </a:solidFill>
+              </a:rPr>
+              <a:t>Zachary Rudin (Team Leader)</a:t>
+            </a:r>
+            <a:endParaRPr lang="en-US" altLang="zh-CN" sz="1000" b="1">
+              <a:solidFill>
+                <a:schemeClr val="bg1"/>
+              </a:solidFill>
+            </a:endParaRPr>
+          </a:p>
+          <a:p>
+            <a:pPr marL="171450" indent="-171450" fontAlgn="auto">
+              <a:lnSpc>
+                <a:spcPts val="1060"/>
+              </a:lnSpc>
+              <a:buFont typeface="Arial" panose="020B0604020202020204" pitchFamily="34" charset="0"/>
+              <a:buChar char="•"/>
+            </a:pPr>
+            <a:r>
+              <a:rPr lang="en-US" altLang="zh-CN" sz="800">
+                <a:solidFill>
+                  <a:schemeClr val="bg1"/>
+                </a:solidFill>
+              </a:rPr>
+              <a:t>Coordinated the project: defined milestones, assigned tasks, and maintained the overall schedule</a:t>
+            </a:r>
+            <a:endParaRPr lang="en-US" altLang="zh-CN" sz="800">
+              <a:solidFill>
+                <a:schemeClr val="bg1"/>
+              </a:solidFill>
+            </a:endParaRPr>
+          </a:p>
+          <a:p>
+            <a:pPr marL="171450" indent="-171450" fontAlgn="auto">
+              <a:lnSpc>
+                <a:spcPts val="1060"/>
+              </a:lnSpc>
+              <a:buFont typeface="Arial" panose="020B0604020202020204" pitchFamily="34" charset="0"/>
+              <a:buChar char="•"/>
+            </a:pPr>
+            <a:r>
+              <a:rPr lang="en-US" altLang="zh-CN" sz="800">
+                <a:solidFill>
+                  <a:schemeClr val="bg1"/>
+                </a:solidFill>
+              </a:rPr>
+              <a:t>Authored weekly progress reports and designed the project poster</a:t>
+            </a:r>
+            <a:endParaRPr lang="en-US" altLang="zh-CN" sz="800">
+              <a:solidFill>
+                <a:schemeClr val="bg1"/>
+              </a:solidFill>
+            </a:endParaRPr>
+          </a:p>
+          <a:p>
+            <a:pPr marL="171450" indent="-171450" fontAlgn="auto">
+              <a:lnSpc>
+                <a:spcPts val="1060"/>
+              </a:lnSpc>
+              <a:buFont typeface="Arial" panose="020B0604020202020204" pitchFamily="34" charset="0"/>
+              <a:buChar char="•"/>
+            </a:pPr>
+            <a:r>
+              <a:rPr lang="en-US" altLang="zh-CN" sz="800">
+                <a:solidFill>
+                  <a:schemeClr val="bg1"/>
+                </a:solidFill>
+              </a:rPr>
+              <a:t>Developed main.cpp, implementing the interactive menu and wiring up all menu-driven features</a:t>
+            </a:r>
+            <a:endParaRPr lang="en-US" altLang="zh-CN" sz="800">
+              <a:solidFill>
+                <a:schemeClr val="bg1"/>
+              </a:solidFill>
+            </a:endParaRPr>
+          </a:p>
+          <a:p>
+            <a:pPr marL="171450" indent="-171450" fontAlgn="auto">
+              <a:lnSpc>
+                <a:spcPts val="1060"/>
+              </a:lnSpc>
+              <a:buFont typeface="Arial" panose="020B0604020202020204" pitchFamily="34" charset="0"/>
+              <a:buChar char="•"/>
+            </a:pPr>
+            <a:r>
+              <a:rPr lang="en-US" altLang="zh-CN" sz="800">
+                <a:solidFill>
+                  <a:schemeClr val="bg1"/>
+                </a:solidFill>
+              </a:rPr>
+              <a:t>Led system testing to ensure program stability and correctness</a:t>
+            </a:r>
+            <a:endParaRPr lang="en-US" altLang="zh-CN" sz="800">
+              <a:solidFill>
+                <a:schemeClr val="bg1"/>
+              </a:solidFill>
+            </a:endParaRPr>
+          </a:p>
+          <a:p>
+            <a:pPr indent="0" fontAlgn="auto">
+              <a:lnSpc>
+                <a:spcPts val="1060"/>
+              </a:lnSpc>
+              <a:buFont typeface="Wingdings" panose="05000000000000000000" charset="0"/>
+              <a:buNone/>
+            </a:pPr>
+            <a:endParaRPr lang="en-US" altLang="zh-CN" sz="800">
+              <a:solidFill>
+                <a:schemeClr val="bg1"/>
+              </a:solidFill>
+            </a:endParaRPr>
+          </a:p>
+          <a:p>
+            <a:pPr algn="l" fontAlgn="auto">
+              <a:lnSpc>
+                <a:spcPts val="1060"/>
+              </a:lnSpc>
+              <a:buClrTx/>
+              <a:buSzTx/>
+              <a:buFontTx/>
+            </a:pPr>
+            <a:r>
+              <a:rPr lang="en-US" altLang="zh-CN" sz="1000" b="1">
+                <a:solidFill>
+                  <a:schemeClr val="bg1"/>
+                </a:solidFill>
+              </a:rPr>
+              <a:t>Leyan Pan (Hash Table)</a:t>
+            </a:r>
+            <a:endParaRPr lang="en-US" altLang="zh-CN" sz="1000" b="1">
+              <a:solidFill>
+                <a:schemeClr val="bg1"/>
+              </a:solidFill>
+            </a:endParaRPr>
+          </a:p>
+          <a:p>
+            <a:pPr marL="171450" indent="-171450" fontAlgn="auto">
+              <a:lnSpc>
+                <a:spcPts val="1060"/>
+              </a:lnSpc>
+              <a:buFont typeface="Arial" panose="020B0604020202020204" pitchFamily="34" charset="0"/>
+              <a:buChar char="•"/>
+            </a:pPr>
+            <a:r>
+              <a:rPr lang="en-US" altLang="zh-CN" sz="800">
+                <a:solidFill>
+                  <a:schemeClr val="bg1"/>
+                </a:solidFill>
+              </a:rPr>
+              <a:t>Designed and implemented the hash table module using the classic polynomial rolling hash (djb2)</a:t>
+            </a:r>
+            <a:endParaRPr lang="en-US" altLang="zh-CN" sz="800">
+              <a:solidFill>
+                <a:schemeClr val="bg1"/>
+              </a:solidFill>
+            </a:endParaRPr>
+          </a:p>
+          <a:p>
+            <a:pPr marL="171450" indent="-171450" fontAlgn="auto">
+              <a:lnSpc>
+                <a:spcPts val="1060"/>
+              </a:lnSpc>
+              <a:buFont typeface="Arial" panose="020B0604020202020204" pitchFamily="34" charset="0"/>
+              <a:buChar char="•"/>
+            </a:pPr>
+            <a:r>
+              <a:rPr lang="en-US" altLang="zh-CN" sz="800">
+                <a:solidFill>
+                  <a:schemeClr val="bg1"/>
+                </a:solidFill>
+              </a:rPr>
+              <a:t>Optimized performance by using bit-shift operations (&lt;&lt;) instead of multiplication</a:t>
+            </a:r>
+            <a:endParaRPr lang="en-US" altLang="zh-CN" sz="800">
+              <a:solidFill>
+                <a:schemeClr val="bg1"/>
+              </a:solidFill>
+            </a:endParaRPr>
+          </a:p>
+          <a:p>
+            <a:pPr marL="171450" indent="-171450" fontAlgn="auto">
+              <a:lnSpc>
+                <a:spcPts val="1060"/>
+              </a:lnSpc>
+              <a:buFont typeface="Arial" panose="020B0604020202020204" pitchFamily="34" charset="0"/>
+              <a:buChar char="•"/>
+            </a:pPr>
+            <a:r>
+              <a:rPr lang="en-US" altLang="zh-CN" sz="800">
+                <a:solidFill>
+                  <a:schemeClr val="bg1"/>
+                </a:solidFill>
+              </a:rPr>
+              <a:t>Handled collisions via chaining; each Creature object is stored (in full) in the hash table</a:t>
+            </a:r>
+            <a:endParaRPr lang="en-US" altLang="zh-CN" sz="800">
+              <a:solidFill>
+                <a:schemeClr val="bg1"/>
+              </a:solidFill>
+            </a:endParaRPr>
+          </a:p>
+          <a:p>
+            <a:pPr indent="0" fontAlgn="auto">
+              <a:lnSpc>
+                <a:spcPts val="1060"/>
+              </a:lnSpc>
+              <a:buFont typeface="Wingdings" panose="05000000000000000000" charset="0"/>
+              <a:buNone/>
+            </a:pPr>
+            <a:endParaRPr lang="en-US" altLang="zh-CN" sz="800">
+              <a:solidFill>
+                <a:schemeClr val="bg1"/>
+              </a:solidFill>
+            </a:endParaRPr>
+          </a:p>
+          <a:p>
+            <a:pPr indent="0" fontAlgn="auto">
+              <a:lnSpc>
+                <a:spcPts val="1060"/>
+              </a:lnSpc>
+              <a:buFont typeface="Wingdings" panose="05000000000000000000" charset="0"/>
+              <a:buNone/>
+            </a:pPr>
+            <a:r>
+              <a:rPr lang="en-US" altLang="zh-CN" sz="1000" b="1">
+                <a:solidFill>
+                  <a:schemeClr val="bg1"/>
+                </a:solidFill>
+              </a:rPr>
+              <a:t>Shunyao Jin (BST &amp; File I/O)</a:t>
+            </a:r>
+            <a:endParaRPr lang="en-US" altLang="zh-CN" sz="1000" b="1">
+              <a:solidFill>
+                <a:schemeClr val="bg1"/>
+              </a:solidFill>
+            </a:endParaRPr>
+          </a:p>
+          <a:p>
+            <a:pPr marL="171450" indent="-171450" fontAlgn="auto">
+              <a:lnSpc>
+                <a:spcPts val="1060"/>
+              </a:lnSpc>
+              <a:buFont typeface="Arial" panose="020B0604020202020204" pitchFamily="34" charset="0"/>
+              <a:buChar char="•"/>
+            </a:pPr>
+            <a:r>
+              <a:rPr lang="en-US" altLang="zh-CN" sz="800">
+                <a:solidFill>
+                  <a:schemeClr val="bg1"/>
+                </a:solidFill>
+              </a:rPr>
+              <a:t>Implemented a binary search tree where each node holds a creature’s key and its index in the hash table</a:t>
+            </a:r>
+            <a:endParaRPr lang="en-US" altLang="zh-CN" sz="800">
+              <a:solidFill>
+                <a:schemeClr val="bg1"/>
+              </a:solidFill>
+            </a:endParaRPr>
+          </a:p>
+          <a:p>
+            <a:pPr marL="171450" indent="-171450" fontAlgn="auto">
+              <a:lnSpc>
+                <a:spcPts val="1060"/>
+              </a:lnSpc>
+              <a:buFont typeface="Arial" panose="020B0604020202020204" pitchFamily="34" charset="0"/>
+              <a:buChar char="•"/>
+            </a:pPr>
+            <a:r>
+              <a:rPr lang="en-US" altLang="zh-CN" sz="800">
+                <a:solidFill>
+                  <a:schemeClr val="bg1"/>
+                </a:solidFill>
+              </a:rPr>
+              <a:t>Developed the File I/O component to read from and write to the data file, maintaining both the BST and hash table structures</a:t>
+            </a:r>
+            <a:endParaRPr lang="en-US" altLang="zh-CN" sz="800">
+              <a:solidFill>
+                <a:schemeClr val="bg1"/>
+              </a:solidFill>
+            </a:endParaRPr>
+          </a:p>
+          <a:p>
+            <a:pPr marL="171450" indent="-171450" fontAlgn="auto">
+              <a:lnSpc>
+                <a:spcPts val="1060"/>
+              </a:lnSpc>
+              <a:buFont typeface="Arial" panose="020B0604020202020204" pitchFamily="34" charset="0"/>
+              <a:buChar char="•"/>
+            </a:pPr>
+            <a:r>
+              <a:rPr lang="en-US" altLang="zh-CN" sz="800">
+                <a:solidFill>
+                  <a:schemeClr val="bg1"/>
+                </a:solidFill>
+              </a:rPr>
+              <a:t>Added automatic rehashing logic in File I/O, ensuring that after a resize the BST node indices remain in sync</a:t>
+            </a:r>
+            <a:endParaRPr lang="en-US" altLang="zh-CN" sz="800">
+              <a:solidFill>
+                <a:schemeClr val="bg1"/>
+              </a:solidFill>
+            </a:endParaRPr>
+          </a:p>
+          <a:p>
+            <a:pPr indent="0" fontAlgn="auto">
+              <a:lnSpc>
+                <a:spcPts val="1060"/>
+              </a:lnSpc>
+              <a:buFont typeface="Wingdings" panose="05000000000000000000" charset="0"/>
+              <a:buNone/>
+            </a:pPr>
+            <a:endParaRPr lang="en-US" altLang="zh-CN" sz="800">
+              <a:solidFill>
+                <a:schemeClr val="bg1"/>
+              </a:solidFill>
+            </a:endParaRPr>
+          </a:p>
+          <a:p>
+            <a:pPr algn="l" fontAlgn="auto">
+              <a:lnSpc>
+                <a:spcPts val="1060"/>
+              </a:lnSpc>
+              <a:buClrTx/>
+              <a:buSzTx/>
+              <a:buFontTx/>
+            </a:pPr>
+            <a:r>
+              <a:rPr lang="en-US" altLang="zh-CN" sz="1000" b="1">
+                <a:solidFill>
+                  <a:schemeClr val="bg1"/>
+                </a:solidFill>
+              </a:rPr>
+              <a:t>Ye Zhang (ScreenManager)</a:t>
+            </a:r>
+            <a:endParaRPr lang="en-US" altLang="zh-CN" sz="1000" b="1">
+              <a:solidFill>
+                <a:schemeClr val="bg1"/>
+              </a:solidFill>
+            </a:endParaRPr>
+          </a:p>
+          <a:p>
+            <a:pPr marL="171450" indent="-171450" fontAlgn="auto">
+              <a:lnSpc>
+                <a:spcPts val="1060"/>
+              </a:lnSpc>
+              <a:buFont typeface="Arial" panose="020B0604020202020204" pitchFamily="34" charset="0"/>
+              <a:buChar char="•"/>
+            </a:pPr>
+            <a:r>
+              <a:rPr lang="en-US" altLang="zh-CN" sz="800">
+                <a:solidFill>
+                  <a:schemeClr val="bg1"/>
+                </a:solidFill>
+              </a:rPr>
+              <a:t>Built ScreenManager.h, which drives all user interactions and menu features</a:t>
+            </a:r>
+            <a:endParaRPr lang="en-US" altLang="zh-CN" sz="800">
+              <a:solidFill>
+                <a:schemeClr val="bg1"/>
+              </a:solidFill>
+            </a:endParaRPr>
+          </a:p>
+          <a:p>
+            <a:pPr marL="171450" indent="-171450" fontAlgn="auto">
+              <a:lnSpc>
+                <a:spcPts val="1060"/>
+              </a:lnSpc>
+              <a:buFont typeface="Arial" panose="020B0604020202020204" pitchFamily="34" charset="0"/>
+              <a:buChar char="•"/>
+            </a:pPr>
+            <a:r>
+              <a:rPr lang="en-US" altLang="zh-CN" sz="800">
+                <a:solidFill>
+                  <a:schemeClr val="bg1"/>
+                </a:solidFill>
+              </a:rPr>
+              <a:t>Acts as the bridge between the user interface and the underlying database, formatting and displaying query results and prompts</a:t>
+            </a:r>
+            <a:endParaRPr lang="en-US" altLang="zh-CN" sz="800">
+              <a:solidFill>
+                <a:schemeClr val="bg1"/>
+              </a:solidFill>
+            </a:endParaRPr>
+          </a:p>
+        </p:txBody>
+      </p:sp>
     </p:spTree>
-    <p:extLst>
-      <p:ext uri="{BB962C8B-B14F-4D97-AF65-F5344CB8AC3E}">
-        <p14:creationId xmlns:p14="http://schemas.microsoft.com/office/powerpoint/2010/main" val="1993074525"/>
-      </p:ext>
-    </p:extLst>
   </p:cSld>
   <p:clrMapOvr>
     <a:masterClrMapping/>
@@ -3941,20 +4075,14 @@
       </p:grpSpPr>
       <p:pic>
         <p:nvPicPr>
-          <p:cNvPr id="2" name="Picture 1" descr="A screenshot of a computer screen&#10;&#10;AI-generated content may be incorrect.">
-            <a:extLst>
-              <a:ext uri="{FF2B5EF4-FFF2-40B4-BE49-F238E27FC236}">
-                <a16:creationId xmlns:a16="http://schemas.microsoft.com/office/drawing/2014/main" id="{6621BE5A-AE98-4884-39B2-DBCBAAA5F1BE}"/>
-              </a:ext>
-            </a:extLst>
-          </p:cNvPr>
+          <p:cNvPr id="2" name="Picture 1" descr="A screenshot of a computer screen&#10;&#10;AI-generated content may be incorrect."/>
           <p:cNvPicPr>
             <a:picLocks noChangeAspect="1"/>
           </p:cNvPicPr>
           <p:nvPr/>
         </p:nvPicPr>
         <p:blipFill>
-          <a:blip r:embed="rId2">
+          <a:blip r:embed="rId1">
             <a:extLst>
               <a:ext uri="{28A0092B-C50C-407E-A947-70E740481C1C}">
                 <a14:useLocalDpi xmlns:a14="http://schemas.microsoft.com/office/drawing/2010/main" val="0"/>
@@ -4012,13 +4140,7 @@
       </p:pic>
       <p:sp>
         <p:nvSpPr>
-          <p:cNvPr id="32" name="TextBox 31">
-            <a:extLst>
-              <a:ext uri="{FF2B5EF4-FFF2-40B4-BE49-F238E27FC236}">
-                <a16:creationId xmlns:a16="http://schemas.microsoft.com/office/drawing/2014/main" id="{30A621C5-9DA5-2895-3035-E9B38308AA61}"/>
-              </a:ext>
-            </a:extLst>
-          </p:cNvPr>
+          <p:cNvPr id="32" name="TextBox 31"/>
           <p:cNvSpPr txBox="1"/>
           <p:nvPr/>
         </p:nvSpPr>
@@ -4049,15 +4171,17 @@
               </a:rPr>
               <a:t>UML diagram</a:t>
             </a:r>
+            <a:endParaRPr lang="en-US" dirty="0">
+              <a:solidFill>
+                <a:schemeClr val="bg1">
+                  <a:lumMod val="95000"/>
+                </a:schemeClr>
+              </a:solidFill>
+            </a:endParaRPr>
           </a:p>
         </p:txBody>
       </p:sp>
     </p:spTree>
-    <p:extLst>
-      <p:ext uri="{BB962C8B-B14F-4D97-AF65-F5344CB8AC3E}">
-        <p14:creationId xmlns:p14="http://schemas.microsoft.com/office/powerpoint/2010/main" val="1846248806"/>
-      </p:ext>
-    </p:extLst>
   </p:cSld>
   <p:clrMapOvr>
     <a:masterClrMapping/>
@@ -4108,7 +4232,7 @@
     </a:clrScheme>
     <a:fontScheme name="Office">
       <a:majorFont>
-        <a:latin typeface="Aptos Display" panose="02110004020202020204"/>
+        <a:latin typeface="Aptos Display"/>
         <a:ea typeface=""/>
         <a:cs typeface=""/>
         <a:font script="Jpan" typeface="游ゴシック Light"/>
@@ -4141,26 +4265,9 @@
         <a:font script="Viet" typeface="Times New Roman"/>
         <a:font script="Uigh" typeface="Microsoft Uighur"/>
         <a:font script="Geor" typeface="Sylfaen"/>
-        <a:font script="Armn" typeface="Arial"/>
-        <a:font script="Bugi" typeface="Leelawadee UI"/>
-        <a:font script="Bopo" typeface="Microsoft JhengHei"/>
-        <a:font script="Java" typeface="Javanese Text"/>
-        <a:font script="Lisu" typeface="Segoe UI"/>
-        <a:font script="Mymr" typeface="Myanmar Text"/>
-        <a:font script="Nkoo" typeface="Ebrima"/>
-        <a:font script="Olck" typeface="Nirmala UI"/>
-        <a:font script="Osma" typeface="Ebrima"/>
-        <a:font script="Phag" typeface="Phagspa"/>
-        <a:font script="Syrn" typeface="Estrangelo Edessa"/>
-        <a:font script="Syrj" typeface="Estrangelo Edessa"/>
-        <a:font script="Syre" typeface="Estrangelo Edessa"/>
-        <a:font script="Sora" typeface="Nirmala UI"/>
-        <a:font script="Tale" typeface="Microsoft Tai Le"/>
-        <a:font script="Talu" typeface="Microsoft New Tai Lue"/>
-        <a:font script="Tfng" typeface="Ebrima"/>
       </a:majorFont>
       <a:minorFont>
-        <a:latin typeface="Aptos" panose="02110004020202020204"/>
+        <a:latin typeface="Aptos"/>
         <a:ea typeface=""/>
         <a:cs typeface=""/>
         <a:font script="Jpan" typeface="游ゴシック"/>
@@ -4193,23 +4300,6 @@
         <a:font script="Viet" typeface="Arial"/>
         <a:font script="Uigh" typeface="Microsoft Uighur"/>
         <a:font script="Geor" typeface="Sylfaen"/>
-        <a:font script="Armn" typeface="Arial"/>
-        <a:font script="Bugi" typeface="Leelawadee UI"/>
-        <a:font script="Bopo" typeface="Microsoft JhengHei"/>
-        <a:font script="Java" typeface="Javanese Text"/>
-        <a:font script="Lisu" typeface="Segoe UI"/>
-        <a:font script="Mymr" typeface="Myanmar Text"/>
-        <a:font script="Nkoo" typeface="Ebrima"/>
-        <a:font script="Olck" typeface="Nirmala UI"/>
-        <a:font script="Osma" typeface="Ebrima"/>
-        <a:font script="Phag" typeface="Phagspa"/>
-        <a:font script="Syrn" typeface="Estrangelo Edessa"/>
-        <a:font script="Syrj" typeface="Estrangelo Edessa"/>
-        <a:font script="Syre" typeface="Estrangelo Edessa"/>
-        <a:font script="Sora" typeface="Nirmala UI"/>
-        <a:font script="Tale" typeface="Microsoft Tai Le"/>
-        <a:font script="Talu" typeface="Microsoft New Tai Lue"/>
-        <a:font script="Tfng" typeface="Ebrima"/>
       </a:minorFont>
     </a:fontScheme>
     <a:fmtScheme name="Office">
@@ -4371,10 +4461,9 @@
       </a:style>
     </a:lnDef>
   </a:objectDefaults>
-  <a:extraClrSchemeLst/>
   <a:extLst>
     <a:ext uri="{05A4C25C-085E-4340-85A3-A5531E510DB2}">
-      <thm15:themeFamily xmlns:thm15="http://schemas.microsoft.com/office/thememl/2012/main" name="Office Theme" id="{2E142A2C-CD16-42D6-873A-C26D2A0506FA}" vid="{1BDDFF52-6CD6-40A5-AB3C-68EB2F1E4D0A}"/>
+      <thm15:themeFamily xmlns:thm15="http://schemas.microsoft.com/office/thememl/2012/main" name="Office Theme" id="{62F939B6-93AF-4DB8-9C6B-D6C7DFDC589F}" vid="{4A3C46E8-61CC-4603-A589-7422A47A8E4A}"/>
     </a:ext>
   </a:extLst>
 </a:theme>

</xml_diff>